<commit_message>
Add Good to Know section, reorder slides
</commit_message>
<xml_diff>
--- a/presentation/presentation.pptx
+++ b/presentation/presentation.pptx
@@ -13,7 +13,8 @@
     <p:sldId id="276" r:id="rId7"/>
     <p:sldId id="272" r:id="rId8"/>
     <p:sldId id="262" r:id="rId9"/>
-    <p:sldId id="258" r:id="rId10"/>
+    <p:sldId id="277" r:id="rId10"/>
+    <p:sldId id="258" r:id="rId11"/>
   </p:sldIdLst>
   <p:sldSz cx="12192000" cy="6858000"/>
   <p:notesSz cx="6858000" cy="9144000"/>
@@ -3521,6 +3522,289 @@
 </p:sld>
 </file>
 
+<file path=ppt/slides/slide10.xml><?xml version="1.0" encoding="utf-8"?>
+<p:sld xmlns:a="http://schemas.openxmlformats.org/drawingml/2006/main" xmlns:r="http://schemas.openxmlformats.org/officeDocument/2006/relationships" xmlns:p="http://schemas.openxmlformats.org/presentationml/2006/main">
+  <p:cSld>
+    <p:spTree>
+      <p:nvGrpSpPr>
+        <p:cNvPr id="1" name=""/>
+        <p:cNvGrpSpPr/>
+        <p:nvPr/>
+      </p:nvGrpSpPr>
+      <p:grpSpPr>
+        <a:xfrm>
+          <a:off x="0" y="0"/>
+          <a:ext cx="0" cy="0"/>
+          <a:chOff x="0" y="0"/>
+          <a:chExt cx="0" cy="0"/>
+        </a:xfrm>
+      </p:grpSpPr>
+      <p:sp>
+        <p:nvSpPr>
+          <p:cNvPr id="2" name="Title 1">
+            <a:extLst>
+              <a:ext uri="{FF2B5EF4-FFF2-40B4-BE49-F238E27FC236}">
+                <a16:creationId xmlns:a16="http://schemas.microsoft.com/office/drawing/2014/main" id="{D522F9FB-04B6-4E41-A38C-C4A555691525}"/>
+              </a:ext>
+            </a:extLst>
+          </p:cNvPr>
+          <p:cNvSpPr>
+            <a:spLocks noGrp="1"/>
+          </p:cNvSpPr>
+          <p:nvPr>
+            <p:ph type="title"/>
+          </p:nvPr>
+        </p:nvSpPr>
+        <p:spPr/>
+        <p:txBody>
+          <a:bodyPr/>
+          <a:lstStyle/>
+          <a:p>
+            <a:r>
+              <a:rPr lang="en-US" dirty="0" err="1"/>
+              <a:t>shinyobjects</a:t>
+            </a:r>
+            <a:r>
+              <a:rPr lang="en-US" dirty="0"/>
+              <a:t> workflow</a:t>
+            </a:r>
+          </a:p>
+        </p:txBody>
+      </p:sp>
+      <p:sp>
+        <p:nvSpPr>
+          <p:cNvPr id="3" name="Content Placeholder 2">
+            <a:extLst>
+              <a:ext uri="{FF2B5EF4-FFF2-40B4-BE49-F238E27FC236}">
+                <a16:creationId xmlns:a16="http://schemas.microsoft.com/office/drawing/2014/main" id="{BB7360C4-80E9-4474-A969-9771EF720C56}"/>
+              </a:ext>
+            </a:extLst>
+          </p:cNvPr>
+          <p:cNvSpPr>
+            <a:spLocks noGrp="1"/>
+          </p:cNvSpPr>
+          <p:nvPr>
+            <p:ph idx="1"/>
+          </p:nvPr>
+        </p:nvSpPr>
+        <p:spPr>
+          <a:xfrm>
+            <a:off x="838200" y="1547446"/>
+            <a:ext cx="10515600" cy="4629517"/>
+          </a:xfrm>
+        </p:spPr>
+        <p:txBody>
+          <a:bodyPr>
+            <a:normAutofit fontScale="85000" lnSpcReduction="20000"/>
+          </a:bodyPr>
+          <a:lstStyle/>
+          <a:p>
+            <a:r>
+              <a:rPr lang="en-US" dirty="0">
+                <a:solidFill>
+                  <a:schemeClr val="tx1">
+                    <a:lumMod val="50000"/>
+                    <a:lumOff val="50000"/>
+                  </a:schemeClr>
+                </a:solidFill>
+                <a:latin typeface="+mj-lt"/>
+                <a:cs typeface="Calibri" panose="020F0502020204030204" pitchFamily="34" charset="0"/>
+              </a:rPr>
+              <a:t>create a </a:t>
+            </a:r>
+            <a:r>
+              <a:rPr lang="en-US" b="1" dirty="0">
+                <a:latin typeface="+mj-lt"/>
+                <a:cs typeface="Calibri" panose="020F0502020204030204" pitchFamily="34" charset="0"/>
+              </a:rPr>
+              <a:t>dummy input </a:t>
+            </a:r>
+            <a:r>
+              <a:rPr lang="en-US" dirty="0">
+                <a:solidFill>
+                  <a:schemeClr val="tx1">
+                    <a:lumMod val="50000"/>
+                    <a:lumOff val="50000"/>
+                  </a:schemeClr>
+                </a:solidFill>
+                <a:latin typeface="+mj-lt"/>
+                <a:cs typeface="Calibri" panose="020F0502020204030204" pitchFamily="34" charset="0"/>
+              </a:rPr>
+              <a:t>object</a:t>
+            </a:r>
+          </a:p>
+          <a:p>
+            <a:endParaRPr lang="en-US" dirty="0">
+              <a:latin typeface="+mj-lt"/>
+              <a:cs typeface="Calibri" panose="020F0502020204030204" pitchFamily="34" charset="0"/>
+            </a:endParaRPr>
+          </a:p>
+          <a:p>
+            <a:r>
+              <a:rPr lang="en-US" b="1" dirty="0" err="1">
+                <a:latin typeface="+mj-lt"/>
+                <a:cs typeface="Calibri" panose="020F0502020204030204" pitchFamily="34" charset="0"/>
+              </a:rPr>
+              <a:t>load_reactive_objects</a:t>
+            </a:r>
+            <a:r>
+              <a:rPr lang="en-US" b="1" dirty="0">
+                <a:latin typeface="+mj-lt"/>
+                <a:cs typeface="Calibri" panose="020F0502020204030204" pitchFamily="34" charset="0"/>
+              </a:rPr>
+              <a:t>()</a:t>
+            </a:r>
+          </a:p>
+          <a:p>
+            <a:pPr lvl="1"/>
+            <a:r>
+              <a:rPr lang="en-US" dirty="0">
+                <a:solidFill>
+                  <a:schemeClr val="tx1">
+                    <a:lumMod val="50000"/>
+                    <a:lumOff val="50000"/>
+                  </a:schemeClr>
+                </a:solidFill>
+                <a:latin typeface="+mj-lt"/>
+                <a:cs typeface="Calibri" panose="020F0502020204030204" pitchFamily="34" charset="0"/>
+              </a:rPr>
+              <a:t>Changes reactive objects to static objects in your global environment </a:t>
+            </a:r>
+          </a:p>
+          <a:p>
+            <a:pPr lvl="1"/>
+            <a:r>
+              <a:rPr lang="en-US" dirty="0">
+                <a:solidFill>
+                  <a:schemeClr val="tx1">
+                    <a:lumMod val="50000"/>
+                    <a:lumOff val="50000"/>
+                  </a:schemeClr>
+                </a:solidFill>
+                <a:latin typeface="+mj-lt"/>
+                <a:cs typeface="Calibri" panose="020F0502020204030204" pitchFamily="34" charset="0"/>
+              </a:rPr>
+              <a:t>Entirely under the hood</a:t>
+            </a:r>
+          </a:p>
+          <a:p>
+            <a:endParaRPr lang="en-US" dirty="0">
+              <a:latin typeface="+mj-lt"/>
+              <a:cs typeface="Calibri" panose="020F0502020204030204" pitchFamily="34" charset="0"/>
+            </a:endParaRPr>
+          </a:p>
+          <a:p>
+            <a:r>
+              <a:rPr lang="en-US" b="1" dirty="0" err="1">
+                <a:latin typeface="+mj-lt"/>
+                <a:cs typeface="Calibri" panose="020F0502020204030204" pitchFamily="34" charset="0"/>
+              </a:rPr>
+              <a:t>convert_selection</a:t>
+            </a:r>
+            <a:r>
+              <a:rPr lang="en-US" b="1" dirty="0">
+                <a:latin typeface="+mj-lt"/>
+                <a:cs typeface="Calibri" panose="020F0502020204030204" pitchFamily="34" charset="0"/>
+              </a:rPr>
+              <a:t>()</a:t>
+            </a:r>
+          </a:p>
+          <a:p>
+            <a:pPr lvl="1"/>
+            <a:r>
+              <a:rPr lang="en-US" dirty="0">
+                <a:solidFill>
+                  <a:schemeClr val="tx1">
+                    <a:lumMod val="50000"/>
+                    <a:lumOff val="50000"/>
+                  </a:schemeClr>
+                </a:solidFill>
+                <a:latin typeface="+mj-lt"/>
+                <a:cs typeface="Calibri" panose="020F0502020204030204" pitchFamily="34" charset="0"/>
+              </a:rPr>
+              <a:t>converts just the code highlighted in source pane</a:t>
+            </a:r>
+          </a:p>
+          <a:p>
+            <a:endParaRPr lang="en-US" dirty="0">
+              <a:latin typeface="+mj-lt"/>
+              <a:cs typeface="Calibri" panose="020F0502020204030204" pitchFamily="34" charset="0"/>
+            </a:endParaRPr>
+          </a:p>
+          <a:p>
+            <a:r>
+              <a:rPr lang="en-US" b="1" dirty="0" err="1">
+                <a:latin typeface="+mj-lt"/>
+                <a:cs typeface="Calibri" panose="020F0502020204030204" pitchFamily="34" charset="0"/>
+              </a:rPr>
+              <a:t>view_ui</a:t>
+            </a:r>
+            <a:r>
+              <a:rPr lang="en-US" b="1" dirty="0">
+                <a:latin typeface="+mj-lt"/>
+                <a:cs typeface="Calibri" panose="020F0502020204030204" pitchFamily="34" charset="0"/>
+              </a:rPr>
+              <a:t>()</a:t>
+            </a:r>
+          </a:p>
+          <a:p>
+            <a:pPr lvl="1"/>
+            <a:r>
+              <a:rPr lang="en-US" dirty="0">
+                <a:solidFill>
+                  <a:schemeClr val="tx1">
+                    <a:lumMod val="50000"/>
+                    <a:lumOff val="50000"/>
+                  </a:schemeClr>
+                </a:solidFill>
+                <a:latin typeface="+mj-lt"/>
+                <a:cs typeface="Calibri" panose="020F0502020204030204" pitchFamily="34" charset="0"/>
+              </a:rPr>
+              <a:t>see what UI components will look like</a:t>
+            </a:r>
+          </a:p>
+          <a:p>
+            <a:pPr lvl="1"/>
+            <a:endParaRPr lang="en-US" dirty="0">
+              <a:latin typeface="+mj-lt"/>
+              <a:cs typeface="Calibri" panose="020F0502020204030204" pitchFamily="34" charset="0"/>
+            </a:endParaRPr>
+          </a:p>
+          <a:p>
+            <a:r>
+              <a:rPr lang="en-US" dirty="0">
+                <a:latin typeface="+mj-lt"/>
+                <a:cs typeface="Calibri" panose="020F0502020204030204" pitchFamily="34" charset="0"/>
+                <a:hlinkClick r:id="rId2"/>
+              </a:rPr>
+              <a:t>https://rjake.github.io/shinyobjects/</a:t>
+            </a:r>
+            <a:endParaRPr lang="en-US" dirty="0">
+              <a:latin typeface="+mj-lt"/>
+              <a:cs typeface="Calibri" panose="020F0502020204030204" pitchFamily="34" charset="0"/>
+            </a:endParaRPr>
+          </a:p>
+          <a:p>
+            <a:endParaRPr lang="en-US" dirty="0">
+              <a:latin typeface="+mj-lt"/>
+              <a:cs typeface="Calibri" panose="020F0502020204030204" pitchFamily="34" charset="0"/>
+            </a:endParaRPr>
+          </a:p>
+        </p:txBody>
+      </p:sp>
+    </p:spTree>
+    <p:extLst>
+      <p:ext uri="{BB962C8B-B14F-4D97-AF65-F5344CB8AC3E}">
+        <p14:creationId xmlns:p14="http://schemas.microsoft.com/office/powerpoint/2010/main" val="736209646"/>
+      </p:ext>
+    </p:extLst>
+  </p:cSld>
+  <p:clrMapOvr>
+    <a:masterClrMapping/>
+  </p:clrMapOvr>
+</p:sld>
+</file>
+
 <file path=ppt/slides/slide2.xml><?xml version="1.0" encoding="utf-8"?>
 <p:sld xmlns:a="http://schemas.openxmlformats.org/drawingml/2006/main" xmlns:r="http://schemas.openxmlformats.org/officeDocument/2006/relationships" xmlns:p="http://schemas.openxmlformats.org/presentationml/2006/main">
   <p:cSld>
@@ -4178,7 +4462,7 @@
             <a:r>
               <a:rPr lang="en-US" dirty="0">
                 <a:solidFill>
-                  <a:schemeClr val="accent6"/>
+                  <a:srgbClr val="00B0F0"/>
                 </a:solidFill>
                 <a:hlinkClick r:id="rId2">
                   <a:extLst>
@@ -4192,17 +4476,9 @@
             </a:r>
             <a:endParaRPr lang="en-US" dirty="0">
               <a:solidFill>
-                <a:schemeClr val="accent6"/>
+                <a:srgbClr val="00B0F0"/>
               </a:solidFill>
             </a:endParaRPr>
-          </a:p>
-          <a:p>
-            <a:pPr lvl="1"/>
-            <a:endParaRPr lang="en-US" dirty="0"/>
-          </a:p>
-          <a:p>
-            <a:pPr lvl="1"/>
-            <a:endParaRPr lang="en-US" dirty="0"/>
           </a:p>
           <a:p>
             <a:pPr lvl="1"/>
@@ -4271,26 +4547,14 @@
                   </a:extLst>
                 </a:hlinkClick>
               </a:rPr>
-              <a:t>/</a:t>
-            </a:r>
-            <a:r>
-              <a:rPr lang="en-US" dirty="0">
-                <a:solidFill>
-                  <a:schemeClr val="accent6"/>
-                </a:solidFill>
-                <a:hlinkClick r:id="rId3">
-                  <a:extLst>
-                    <a:ext uri="{A12FA001-AC4F-418D-AE19-62706E023703}">
-                      <ahyp:hlinkClr xmlns:ahyp="http://schemas.microsoft.com/office/drawing/2018/hyperlinkcolor" val="tx"/>
-                    </a:ext>
-                  </a:extLst>
-                </a:hlinkClick>
-              </a:rPr>
-              <a:t>workshop-flexdashboard-shinyobjects</a:t>
+              <a:t>/workshop-flexdashboard-shinyobjects</a:t>
             </a:r>
             <a:endParaRPr lang="en-US" dirty="0">
               <a:solidFill>
-                <a:schemeClr val="accent6"/>
+                <a:schemeClr val="tx1">
+                  <a:lumMod val="50000"/>
+                  <a:lumOff val="50000"/>
+                </a:schemeClr>
               </a:solidFill>
             </a:endParaRPr>
           </a:p>
@@ -4329,8 +4593,8 @@
         </p:blipFill>
         <p:spPr bwMode="auto">
           <a:xfrm>
-            <a:off x="2050046" y="3429000"/>
-            <a:ext cx="6610350" cy="1600200"/>
+            <a:off x="6096000" y="1690688"/>
+            <a:ext cx="5061411" cy="1225241"/>
           </a:xfrm>
           <a:prstGeom prst="rect">
             <a:avLst/>
@@ -4421,9 +4685,16 @@
             <p:ph idx="1"/>
           </p:nvPr>
         </p:nvSpPr>
-        <p:spPr/>
+        <p:spPr>
+          <a:xfrm>
+            <a:off x="838200" y="1509102"/>
+            <a:ext cx="10515600" cy="4351338"/>
+          </a:xfrm>
+        </p:spPr>
         <p:txBody>
-          <a:bodyPr/>
+          <a:bodyPr>
+            <a:normAutofit lnSpcReduction="10000"/>
+          </a:bodyPr>
           <a:lstStyle/>
           <a:p>
             <a:r>
@@ -4584,6 +4855,16 @@
                 <a:cs typeface="Calibri" panose="020F0502020204030204" pitchFamily="34" charset="0"/>
               </a:rPr>
               <a:t>Will not be covered in detail</a:t>
+            </a:r>
+          </a:p>
+          <a:p>
+            <a:pPr lvl="1"/>
+            <a:r>
+              <a:rPr lang="en-US" dirty="0">
+                <a:latin typeface="Calibri" panose="020F0502020204030204" pitchFamily="34" charset="0"/>
+                <a:cs typeface="Calibri" panose="020F0502020204030204" pitchFamily="34" charset="0"/>
+              </a:rPr>
+              <a:t>shiny proper</a:t>
             </a:r>
             <a:endParaRPr lang="en-US" dirty="0"/>
           </a:p>
@@ -4716,7 +4997,7 @@
           </a:prstGeom>
           <a:ln>
             <a:solidFill>
-              <a:schemeClr val="tx1"/>
+              <a:srgbClr val="00B0F0"/>
             </a:solidFill>
           </a:ln>
         </p:spPr>
@@ -4763,9 +5044,9 @@
             <a:prstGeom prst="straightConnector1">
               <a:avLst/>
             </a:prstGeom>
-            <a:ln w="76200">
+            <a:ln w="28575">
               <a:solidFill>
-                <a:schemeClr val="tx1"/>
+                <a:schemeClr val="accent2"/>
               </a:solidFill>
               <a:headEnd type="triangle" w="med" len="med"/>
               <a:tailEnd type="triangle" w="med" len="med"/>
@@ -4808,9 +5089,9 @@
             <a:prstGeom prst="straightConnector1">
               <a:avLst/>
             </a:prstGeom>
-            <a:ln w="76200">
+            <a:ln w="28575">
               <a:solidFill>
-                <a:schemeClr val="tx1"/>
+                <a:schemeClr val="accent2"/>
               </a:solidFill>
               <a:tailEnd type="triangle"/>
             </a:ln>
@@ -4852,9 +5133,9 @@
             <a:prstGeom prst="straightConnector1">
               <a:avLst/>
             </a:prstGeom>
-            <a:ln w="76200">
+            <a:ln w="28575">
               <a:solidFill>
-                <a:schemeClr val="tx1"/>
+                <a:schemeClr val="accent2"/>
               </a:solidFill>
               <a:tailEnd type="triangle"/>
             </a:ln>
@@ -4875,125 +5156,104 @@
           </p:style>
         </p:cxnSp>
       </p:grpSp>
-      <p:grpSp>
-        <p:nvGrpSpPr>
-          <p:cNvPr id="35" name="Group 34">
+      <p:sp>
+        <p:nvSpPr>
+          <p:cNvPr id="22" name="TextBox 21">
             <a:extLst>
               <a:ext uri="{FF2B5EF4-FFF2-40B4-BE49-F238E27FC236}">
-                <a16:creationId xmlns:a16="http://schemas.microsoft.com/office/drawing/2014/main" id="{247A6AF2-90D3-47D8-A4D0-A6E5029D2924}"/>
+                <a16:creationId xmlns:a16="http://schemas.microsoft.com/office/drawing/2014/main" id="{91669EE6-9ABC-4430-87AF-902FA992385C}"/>
               </a:ext>
             </a:extLst>
           </p:cNvPr>
-          <p:cNvGrpSpPr/>
+          <p:cNvSpPr txBox="1"/>
           <p:nvPr/>
-        </p:nvGrpSpPr>
-        <p:grpSpPr>
+        </p:nvSpPr>
+        <p:spPr>
           <a:xfrm>
             <a:off x="974762" y="1696916"/>
-            <a:ext cx="1425390" cy="2029837"/>
-            <a:chOff x="974762" y="1696916"/>
-            <a:chExt cx="1425390" cy="2029837"/>
+            <a:ext cx="1425390" cy="369332"/>
           </a:xfrm>
-        </p:grpSpPr>
-        <p:sp>
-          <p:nvSpPr>
-            <p:cNvPr id="22" name="TextBox 21">
-              <a:extLst>
-                <a:ext uri="{FF2B5EF4-FFF2-40B4-BE49-F238E27FC236}">
-                  <a16:creationId xmlns:a16="http://schemas.microsoft.com/office/drawing/2014/main" id="{91669EE6-9ABC-4430-87AF-902FA992385C}"/>
-                </a:ext>
-              </a:extLst>
-            </p:cNvPr>
-            <p:cNvSpPr txBox="1"/>
-            <p:nvPr/>
-          </p:nvSpPr>
-          <p:spPr>
-            <a:xfrm>
-              <a:off x="974762" y="1696916"/>
-              <a:ext cx="1425390" cy="369332"/>
-            </a:xfrm>
-            <a:prstGeom prst="rect">
-              <a:avLst/>
-            </a:prstGeom>
+          <a:prstGeom prst="rect">
+            <a:avLst/>
+          </a:prstGeom>
+          <a:solidFill>
+            <a:schemeClr val="bg1"/>
+          </a:solidFill>
+          <a:ln>
             <a:solidFill>
-              <a:schemeClr val="bg1"/>
+              <a:schemeClr val="tx1"/>
             </a:solidFill>
-            <a:ln>
-              <a:solidFill>
-                <a:schemeClr val="tx1"/>
-              </a:solidFill>
-            </a:ln>
-          </p:spPr>
-          <p:txBody>
-            <a:bodyPr wrap="none" rtlCol="0">
-              <a:spAutoFit/>
-            </a:bodyPr>
-            <a:lstStyle/>
-            <a:p>
-              <a:r>
-                <a:rPr lang="en-US" b="1" dirty="0" err="1">
-                  <a:latin typeface="Courier New" panose="02070309020205020404" pitchFamily="49" charset="0"/>
-                  <a:cs typeface="Courier New" panose="02070309020205020404" pitchFamily="49" charset="0"/>
-                </a:rPr>
-                <a:t>input$age</a:t>
-              </a:r>
-              <a:endParaRPr lang="en-US" b="1" dirty="0">
-                <a:latin typeface="Courier New" panose="02070309020205020404" pitchFamily="49" charset="0"/>
-                <a:cs typeface="Courier New" panose="02070309020205020404" pitchFamily="49" charset="0"/>
-              </a:endParaRPr>
-            </a:p>
-          </p:txBody>
-        </p:sp>
-        <p:sp>
-          <p:nvSpPr>
-            <p:cNvPr id="23" name="TextBox 22">
-              <a:extLst>
-                <a:ext uri="{FF2B5EF4-FFF2-40B4-BE49-F238E27FC236}">
-                  <a16:creationId xmlns:a16="http://schemas.microsoft.com/office/drawing/2014/main" id="{A9B2BDB6-915A-47DB-9E21-D02DAF5977AE}"/>
-                </a:ext>
-              </a:extLst>
-            </p:cNvPr>
-            <p:cNvSpPr txBox="1"/>
-            <p:nvPr/>
-          </p:nvSpPr>
-          <p:spPr>
-            <a:xfrm>
-              <a:off x="1181814" y="3357421"/>
-              <a:ext cx="1149674" cy="369332"/>
-            </a:xfrm>
-            <a:prstGeom prst="rect">
-              <a:avLst/>
-            </a:prstGeom>
+          </a:ln>
+        </p:spPr>
+        <p:txBody>
+          <a:bodyPr wrap="none" rtlCol="0">
+            <a:spAutoFit/>
+          </a:bodyPr>
+          <a:lstStyle/>
+          <a:p>
+            <a:r>
+              <a:rPr lang="en-US" b="1" dirty="0" err="1">
+                <a:latin typeface="Courier New" panose="02070309020205020404" pitchFamily="49" charset="0"/>
+                <a:cs typeface="Courier New" panose="02070309020205020404" pitchFamily="49" charset="0"/>
+              </a:rPr>
+              <a:t>input$age</a:t>
+            </a:r>
+            <a:endParaRPr lang="en-US" b="1" dirty="0">
+              <a:latin typeface="Courier New" panose="02070309020205020404" pitchFamily="49" charset="0"/>
+              <a:cs typeface="Courier New" panose="02070309020205020404" pitchFamily="49" charset="0"/>
+            </a:endParaRPr>
+          </a:p>
+        </p:txBody>
+      </p:sp>
+      <p:sp>
+        <p:nvSpPr>
+          <p:cNvPr id="23" name="TextBox 22">
+            <a:extLst>
+              <a:ext uri="{FF2B5EF4-FFF2-40B4-BE49-F238E27FC236}">
+                <a16:creationId xmlns:a16="http://schemas.microsoft.com/office/drawing/2014/main" id="{A9B2BDB6-915A-47DB-9E21-D02DAF5977AE}"/>
+              </a:ext>
+            </a:extLst>
+          </p:cNvPr>
+          <p:cNvSpPr txBox="1"/>
+          <p:nvPr/>
+        </p:nvSpPr>
+        <p:spPr>
+          <a:xfrm>
+            <a:off x="1181814" y="3357421"/>
+            <a:ext cx="1149674" cy="369332"/>
+          </a:xfrm>
+          <a:prstGeom prst="rect">
+            <a:avLst/>
+          </a:prstGeom>
+          <a:solidFill>
+            <a:schemeClr val="bg1"/>
+          </a:solidFill>
+          <a:ln>
             <a:solidFill>
-              <a:schemeClr val="bg1"/>
+              <a:schemeClr val="tx1"/>
             </a:solidFill>
-            <a:ln>
-              <a:solidFill>
-                <a:schemeClr val="tx1"/>
-              </a:solidFill>
-            </a:ln>
-          </p:spPr>
-          <p:txBody>
-            <a:bodyPr wrap="none" rtlCol="0">
-              <a:spAutoFit/>
-            </a:bodyPr>
-            <a:lstStyle/>
-            <a:p>
-              <a:r>
-                <a:rPr lang="en-US" b="1" dirty="0" err="1">
-                  <a:latin typeface="Courier New" panose="02070309020205020404" pitchFamily="49" charset="0"/>
-                  <a:cs typeface="Courier New" panose="02070309020205020404" pitchFamily="49" charset="0"/>
-                </a:rPr>
-                <a:t>input$n</a:t>
-              </a:r>
-              <a:endParaRPr lang="en-US" b="1" dirty="0">
-                <a:latin typeface="Courier New" panose="02070309020205020404" pitchFamily="49" charset="0"/>
-                <a:cs typeface="Courier New" panose="02070309020205020404" pitchFamily="49" charset="0"/>
-              </a:endParaRPr>
-            </a:p>
-          </p:txBody>
-        </p:sp>
-      </p:grpSp>
+          </a:ln>
+        </p:spPr>
+        <p:txBody>
+          <a:bodyPr wrap="none" rtlCol="0">
+            <a:spAutoFit/>
+          </a:bodyPr>
+          <a:lstStyle/>
+          <a:p>
+            <a:r>
+              <a:rPr lang="en-US" b="1" dirty="0" err="1">
+                <a:latin typeface="Courier New" panose="02070309020205020404" pitchFamily="49" charset="0"/>
+                <a:cs typeface="Courier New" panose="02070309020205020404" pitchFamily="49" charset="0"/>
+              </a:rPr>
+              <a:t>input$n</a:t>
+            </a:r>
+            <a:endParaRPr lang="en-US" b="1" dirty="0">
+              <a:latin typeface="Courier New" panose="02070309020205020404" pitchFamily="49" charset="0"/>
+              <a:cs typeface="Courier New" panose="02070309020205020404" pitchFamily="49" charset="0"/>
+            </a:endParaRPr>
+          </a:p>
+        </p:txBody>
+      </p:sp>
       <p:grpSp>
         <p:nvGrpSpPr>
           <p:cNvPr id="34" name="Group 33">
@@ -5009,9 +5269,9 @@
         <p:grpSpPr>
           <a:xfrm>
             <a:off x="1890346" y="722696"/>
-            <a:ext cx="6392673" cy="2808358"/>
+            <a:ext cx="6392673" cy="1044586"/>
             <a:chOff x="1890346" y="722696"/>
-            <a:chExt cx="6392673" cy="2808358"/>
+            <a:chExt cx="6392673" cy="1044586"/>
           </a:xfrm>
         </p:grpSpPr>
         <p:sp>
@@ -5151,128 +5411,6 @@
             </a:p>
           </p:txBody>
         </p:sp>
-        <p:sp>
-          <p:nvSpPr>
-            <p:cNvPr id="27" name="Freeform: Shape 26">
-              <a:extLst>
-                <a:ext uri="{FF2B5EF4-FFF2-40B4-BE49-F238E27FC236}">
-                  <a16:creationId xmlns:a16="http://schemas.microsoft.com/office/drawing/2014/main" id="{16353855-2472-4F1D-9D9D-A825CE585023}"/>
-                </a:ext>
-              </a:extLst>
-            </p:cNvPr>
-            <p:cNvSpPr/>
-            <p:nvPr/>
-          </p:nvSpPr>
-          <p:spPr>
-            <a:xfrm>
-              <a:off x="2331488" y="1825347"/>
-              <a:ext cx="4290646" cy="1705707"/>
-            </a:xfrm>
-            <a:custGeom>
-              <a:avLst/>
-              <a:gdLst>
-                <a:gd name="connsiteX0" fmla="*/ 0 w 4580792"/>
-                <a:gd name="connsiteY0" fmla="*/ 974219 h 974219"/>
-                <a:gd name="connsiteX1" fmla="*/ 2250831 w 4580792"/>
-                <a:gd name="connsiteY1" fmla="*/ 7066 h 974219"/>
-                <a:gd name="connsiteX2" fmla="*/ 4580792 w 4580792"/>
-                <a:gd name="connsiteY2" fmla="*/ 613735 h 974219"/>
-                <a:gd name="connsiteX0" fmla="*/ 0 w 4580792"/>
-                <a:gd name="connsiteY0" fmla="*/ 663677 h 663677"/>
-                <a:gd name="connsiteX1" fmla="*/ 2294792 w 4580792"/>
-                <a:gd name="connsiteY1" fmla="*/ 30631 h 663677"/>
-                <a:gd name="connsiteX2" fmla="*/ 4580792 w 4580792"/>
-                <a:gd name="connsiteY2" fmla="*/ 303193 h 663677"/>
-                <a:gd name="connsiteX0" fmla="*/ 0 w 4290646"/>
-                <a:gd name="connsiteY0" fmla="*/ 1767010 h 1767010"/>
-                <a:gd name="connsiteX1" fmla="*/ 2294792 w 4290646"/>
-                <a:gd name="connsiteY1" fmla="*/ 1133964 h 1767010"/>
-                <a:gd name="connsiteX2" fmla="*/ 4290646 w 4290646"/>
-                <a:gd name="connsiteY2" fmla="*/ 61303 h 1767010"/>
-                <a:gd name="connsiteX0" fmla="*/ 0 w 4290646"/>
-                <a:gd name="connsiteY0" fmla="*/ 1705707 h 1705707"/>
-                <a:gd name="connsiteX1" fmla="*/ 2294792 w 4290646"/>
-                <a:gd name="connsiteY1" fmla="*/ 1072661 h 1705707"/>
-                <a:gd name="connsiteX2" fmla="*/ 4290646 w 4290646"/>
-                <a:gd name="connsiteY2" fmla="*/ 0 h 1705707"/>
-                <a:gd name="connsiteX0" fmla="*/ 0 w 4290646"/>
-                <a:gd name="connsiteY0" fmla="*/ 1705707 h 1705707"/>
-                <a:gd name="connsiteX1" fmla="*/ 2294792 w 4290646"/>
-                <a:gd name="connsiteY1" fmla="*/ 1072661 h 1705707"/>
-                <a:gd name="connsiteX2" fmla="*/ 4290646 w 4290646"/>
-                <a:gd name="connsiteY2" fmla="*/ 0 h 1705707"/>
-                <a:gd name="connsiteX0" fmla="*/ 0 w 4290646"/>
-                <a:gd name="connsiteY0" fmla="*/ 1705707 h 1705707"/>
-                <a:gd name="connsiteX1" fmla="*/ 2505808 w 4290646"/>
-                <a:gd name="connsiteY1" fmla="*/ 1292469 h 1705707"/>
-                <a:gd name="connsiteX2" fmla="*/ 4290646 w 4290646"/>
-                <a:gd name="connsiteY2" fmla="*/ 0 h 1705707"/>
-              </a:gdLst>
-              <a:ahLst/>
-              <a:cxnLst>
-                <a:cxn ang="0">
-                  <a:pos x="connsiteX0" y="connsiteY0"/>
-                </a:cxn>
-                <a:cxn ang="0">
-                  <a:pos x="connsiteX1" y="connsiteY1"/>
-                </a:cxn>
-                <a:cxn ang="0">
-                  <a:pos x="connsiteX2" y="connsiteY2"/>
-                </a:cxn>
-              </a:cxnLst>
-              <a:rect l="l" t="t" r="r" b="b"/>
-              <a:pathLst>
-                <a:path w="4290646" h="1705707">
-                  <a:moveTo>
-                    <a:pt x="0" y="1705707"/>
-                  </a:moveTo>
-                  <a:cubicBezTo>
-                    <a:pt x="998660" y="1568694"/>
-                    <a:pt x="1790700" y="1576753"/>
-                    <a:pt x="2505808" y="1292469"/>
-                  </a:cubicBezTo>
-                  <a:cubicBezTo>
-                    <a:pt x="3220916" y="1008185"/>
-                    <a:pt x="3595321" y="677741"/>
-                    <a:pt x="4290646" y="0"/>
-                  </a:cubicBezTo>
-                </a:path>
-              </a:pathLst>
-            </a:custGeom>
-            <a:noFill/>
-            <a:ln w="38100">
-              <a:solidFill>
-                <a:schemeClr val="accent2"/>
-              </a:solidFill>
-              <a:headEnd type="none" w="med" len="med"/>
-              <a:tailEnd type="triangle" w="med" len="med"/>
-            </a:ln>
-          </p:spPr>
-          <p:style>
-            <a:lnRef idx="2">
-              <a:schemeClr val="accent1">
-                <a:shade val="50000"/>
-              </a:schemeClr>
-            </a:lnRef>
-            <a:fillRef idx="1">
-              <a:schemeClr val="accent1"/>
-            </a:fillRef>
-            <a:effectRef idx="0">
-              <a:schemeClr val="accent1"/>
-            </a:effectRef>
-            <a:fontRef idx="minor">
-              <a:schemeClr val="lt1"/>
-            </a:fontRef>
-          </p:style>
-          <p:txBody>
-            <a:bodyPr rtlCol="0" anchor="ctr"/>
-            <a:lstStyle/>
-            <a:p>
-              <a:pPr algn="ctr"/>
-              <a:endParaRPr lang="en-US"/>
-            </a:p>
-          </p:txBody>
-        </p:sp>
       </p:grpSp>
       <p:grpSp>
         <p:nvGrpSpPr>
@@ -5314,7 +5452,10 @@
             <a:prstGeom prst="straightConnector1">
               <a:avLst/>
             </a:prstGeom>
-            <a:ln>
+            <a:ln w="19050">
+              <a:solidFill>
+                <a:srgbClr val="00B0F0"/>
+              </a:solidFill>
               <a:tailEnd type="triangle"/>
             </a:ln>
           </p:spPr>
@@ -5354,6 +5495,11 @@
               <a:avLst/>
             </a:prstGeom>
             <a:noFill/>
+            <a:ln w="19050">
+              <a:solidFill>
+                <a:srgbClr val="00B0F0"/>
+              </a:solidFill>
+            </a:ln>
           </p:spPr>
           <p:style>
             <a:lnRef idx="2">
@@ -5396,9 +5542,9 @@
         <p:grpSpPr>
           <a:xfrm>
             <a:off x="2331488" y="2627202"/>
-            <a:ext cx="5634342" cy="3342775"/>
+            <a:ext cx="5687097" cy="3342775"/>
             <a:chOff x="2331488" y="2627202"/>
-            <a:chExt cx="5634342" cy="3342775"/>
+            <a:chExt cx="5687097" cy="3342775"/>
           </a:xfrm>
         </p:grpSpPr>
         <p:cxnSp>
@@ -5411,19 +5557,23 @@
               </a:extLst>
             </p:cNvPr>
             <p:cNvCxnSpPr>
+              <a:cxnSpLocks/>
               <a:stCxn id="23" idx="3"/>
             </p:cNvCxnSpPr>
             <p:nvPr/>
           </p:nvCxnSpPr>
           <p:spPr>
-            <a:xfrm>
-              <a:off x="2331488" y="3542087"/>
-              <a:ext cx="5060594" cy="1944313"/>
+            <a:xfrm flipV="1">
+              <a:off x="2331488" y="3500580"/>
+              <a:ext cx="5241027" cy="41507"/>
             </a:xfrm>
             <a:prstGeom prst="straightConnector1">
               <a:avLst/>
             </a:prstGeom>
-            <a:ln>
+            <a:ln w="19050">
+              <a:solidFill>
+                <a:srgbClr val="00B0F0"/>
+              </a:solidFill>
               <a:tailEnd type="triangle"/>
             </a:ln>
           </p:spPr>
@@ -5457,12 +5607,17 @@
           <p:spPr>
             <a:xfrm>
               <a:off x="7572515" y="2627202"/>
-              <a:ext cx="393315" cy="3342775"/>
+              <a:ext cx="446070" cy="3342775"/>
             </a:xfrm>
             <a:prstGeom prst="roundRect">
               <a:avLst/>
             </a:prstGeom>
             <a:noFill/>
+            <a:ln w="19050">
+              <a:solidFill>
+                <a:srgbClr val="00B0F0"/>
+              </a:solidFill>
+            </a:ln>
           </p:spPr>
           <p:style>
             <a:lnRef idx="2">
@@ -5485,7 +5640,7 @@
             <a:lstStyle/>
             <a:p>
               <a:pPr algn="ctr"/>
-              <a:endParaRPr lang="en-US"/>
+              <a:endParaRPr lang="en-US" dirty="0"/>
             </a:p>
           </p:txBody>
         </p:sp>
@@ -5521,7 +5676,7 @@
                             </p:stCondLst>
                             <p:childTnLst>
                               <p:par>
-                                <p:cTn id="5" presetID="1" presetClass="entr" presetSubtype="0" fill="hold" nodeType="clickEffect">
+                                <p:cTn id="5" presetID="1" presetClass="entr" presetSubtype="0" fill="hold" grpId="0" nodeType="clickEffect">
                                   <p:stCondLst>
                                     <p:cond delay="0"/>
                                   </p:stCondLst>
@@ -5534,7 +5689,7 @@
                                           </p:stCondLst>
                                         </p:cTn>
                                         <p:tgtEl>
-                                          <p:spTgt spid="35"/>
+                                          <p:spTgt spid="22"/>
                                         </p:tgtEl>
                                         <p:attrNameLst>
                                           <p:attrName>style.visibility</p:attrName>
@@ -5656,7 +5811,7 @@
                             </p:stCondLst>
                             <p:childTnLst>
                               <p:par>
-                                <p:cTn id="17" presetID="1" presetClass="entr" presetSubtype="0" fill="hold" nodeType="clickEffect">
+                                <p:cTn id="17" presetID="1" presetClass="entr" presetSubtype="0" fill="hold" grpId="0" nodeType="clickEffect">
                                   <p:stCondLst>
                                     <p:cond delay="0"/>
                                   </p:stCondLst>
@@ -5669,7 +5824,7 @@
                                           </p:stCondLst>
                                         </p:cTn>
                                         <p:tgtEl>
-                                          <p:spTgt spid="38"/>
+                                          <p:spTgt spid="23"/>
                                         </p:tgtEl>
                                         <p:attrNameLst>
                                           <p:attrName>style.visibility</p:attrName>
@@ -5709,6 +5864,51 @@
                                     <p:set>
                                       <p:cBhvr>
                                         <p:cTn id="22" dur="1" fill="hold">
+                                          <p:stCondLst>
+                                            <p:cond delay="0"/>
+                                          </p:stCondLst>
+                                        </p:cTn>
+                                        <p:tgtEl>
+                                          <p:spTgt spid="38"/>
+                                        </p:tgtEl>
+                                        <p:attrNameLst>
+                                          <p:attrName>style.visibility</p:attrName>
+                                        </p:attrNameLst>
+                                      </p:cBhvr>
+                                      <p:to>
+                                        <p:strVal val="visible"/>
+                                      </p:to>
+                                    </p:set>
+                                  </p:childTnLst>
+                                </p:cTn>
+                              </p:par>
+                            </p:childTnLst>
+                          </p:cTn>
+                        </p:par>
+                      </p:childTnLst>
+                    </p:cTn>
+                  </p:par>
+                  <p:par>
+                    <p:cTn id="23" fill="hold">
+                      <p:stCondLst>
+                        <p:cond delay="indefinite"/>
+                      </p:stCondLst>
+                      <p:childTnLst>
+                        <p:par>
+                          <p:cTn id="24" fill="hold">
+                            <p:stCondLst>
+                              <p:cond delay="0"/>
+                            </p:stCondLst>
+                            <p:childTnLst>
+                              <p:par>
+                                <p:cTn id="25" presetID="1" presetClass="entr" presetSubtype="0" fill="hold" nodeType="clickEffect">
+                                  <p:stCondLst>
+                                    <p:cond delay="0"/>
+                                  </p:stCondLst>
+                                  <p:childTnLst>
+                                    <p:set>
+                                      <p:cBhvr>
+                                        <p:cTn id="26" dur="1" fill="hold">
                                           <p:stCondLst>
                                             <p:cond delay="0"/>
                                           </p:stCondLst>
@@ -5754,6 +5954,10 @@
         </p:cTn>
       </p:par>
     </p:tnLst>
+    <p:bldLst>
+      <p:bldP spid="22" grpId="0" animBg="1"/>
+      <p:bldP spid="23" grpId="0" animBg="1"/>
+    </p:bldLst>
   </p:timing>
 </p:sld>
 </file>
@@ -6067,7 +6271,7 @@
         </p:nvSpPr>
         <p:spPr>
           <a:xfrm>
-            <a:off x="5575144" y="3735449"/>
+            <a:off x="5575144" y="4239271"/>
             <a:ext cx="6726243" cy="2554545"/>
           </a:xfrm>
           <a:prstGeom prst="rect">
@@ -6129,39 +6333,58 @@
                 <a:latin typeface="Courier New" panose="02070309020205020404" pitchFamily="49" charset="0"/>
                 <a:cs typeface="Courier New" panose="02070309020205020404" pitchFamily="49" charset="0"/>
               </a:rPr>
-              <a:t>    filtered_data() %&gt;%</a:t>
-            </a:r>
-          </a:p>
-          <a:p>
-            <a:r>
-              <a:rPr lang="en-US" sz="1600" dirty="0">
-                <a:latin typeface="Courier New" panose="02070309020205020404" pitchFamily="49" charset="0"/>
-                <a:cs typeface="Courier New" panose="02070309020205020404" pitchFamily="49" charset="0"/>
-              </a:rPr>
-              <a:t>    mutate(breed = </a:t>
-            </a:r>
-            <a:r>
-              <a:rPr lang="en-US" sz="1600" dirty="0" err="1">
-                <a:latin typeface="Courier New" panose="02070309020205020404" pitchFamily="49" charset="0"/>
-                <a:cs typeface="Courier New" panose="02070309020205020404" pitchFamily="49" charset="0"/>
-              </a:rPr>
-              <a:t>fct_lump</a:t>
-            </a:r>
-            <a:r>
-              <a:rPr lang="en-US" sz="1600" dirty="0">
-                <a:latin typeface="Courier New" panose="02070309020205020404" pitchFamily="49" charset="0"/>
-                <a:cs typeface="Courier New" panose="02070309020205020404" pitchFamily="49" charset="0"/>
-              </a:rPr>
-              <a:t>(breed, </a:t>
+              <a:t>    </a:t>
             </a:r>
             <a:r>
               <a:rPr lang="en-US" sz="1600" b="1" dirty="0">
                 <a:solidFill>
-                  <a:srgbClr val="00B0F0"/>
+                  <a:schemeClr val="accent2">
+                    <a:lumMod val="75000"/>
+                  </a:schemeClr>
                 </a:solidFill>
                 <a:latin typeface="Courier New" panose="02070309020205020404" pitchFamily="49" charset="0"/>
                 <a:cs typeface="Courier New" panose="02070309020205020404" pitchFamily="49" charset="0"/>
               </a:rPr>
+              <a:t>filtered_data() </a:t>
+            </a:r>
+            <a:r>
+              <a:rPr lang="en-US" sz="1600" dirty="0">
+                <a:latin typeface="Courier New" panose="02070309020205020404" pitchFamily="49" charset="0"/>
+                <a:cs typeface="Courier New" panose="02070309020205020404" pitchFamily="49" charset="0"/>
+              </a:rPr>
+              <a:t>%&gt;%</a:t>
+            </a:r>
+          </a:p>
+          <a:p>
+            <a:r>
+              <a:rPr lang="en-US" sz="1600" dirty="0">
+                <a:latin typeface="Courier New" panose="02070309020205020404" pitchFamily="49" charset="0"/>
+                <a:cs typeface="Courier New" panose="02070309020205020404" pitchFamily="49" charset="0"/>
+              </a:rPr>
+              <a:t>    mutate(breed = </a:t>
+            </a:r>
+            <a:r>
+              <a:rPr lang="en-US" sz="1600" dirty="0" err="1">
+                <a:latin typeface="Courier New" panose="02070309020205020404" pitchFamily="49" charset="0"/>
+                <a:cs typeface="Courier New" panose="02070309020205020404" pitchFamily="49" charset="0"/>
+              </a:rPr>
+              <a:t>fct_lump</a:t>
+            </a:r>
+            <a:r>
+              <a:rPr lang="en-US" sz="1600" dirty="0">
+                <a:latin typeface="Courier New" panose="02070309020205020404" pitchFamily="49" charset="0"/>
+                <a:cs typeface="Courier New" panose="02070309020205020404" pitchFamily="49" charset="0"/>
+              </a:rPr>
+              <a:t>(breed, </a:t>
+            </a:r>
+            <a:r>
+              <a:rPr lang="en-US" sz="1600" b="1" dirty="0">
+                <a:solidFill>
+                  <a:srgbClr val="7030A0"/>
+                </a:solidFill>
+                <a:latin typeface="Courier New" panose="02070309020205020404" pitchFamily="49" charset="0"/>
+                <a:cs typeface="Courier New" panose="02070309020205020404" pitchFamily="49" charset="0"/>
+              </a:rPr>
               <a:t>input$n</a:t>
             </a:r>
             <a:r>
@@ -6238,7 +6461,7 @@
                 <a:latin typeface="Courier New" panose="02070309020205020404" pitchFamily="49" charset="0"/>
                 <a:cs typeface="Courier New" panose="02070309020205020404" pitchFamily="49" charset="0"/>
               </a:rPr>
-              <a:t>    labs(title = glue("Age group:{</a:t>
+              <a:t>    labs(title = </a:t>
             </a:r>
             <a:r>
               <a:rPr lang="en-US" sz="1600" b="1" dirty="0" err="1">
@@ -6255,7 +6478,7 @@
                 <a:latin typeface="Courier New" panose="02070309020205020404" pitchFamily="49" charset="0"/>
                 <a:cs typeface="Courier New" panose="02070309020205020404" pitchFamily="49" charset="0"/>
               </a:rPr>
-              <a:t>}"))</a:t>
+              <a:t>))</a:t>
             </a:r>
           </a:p>
           <a:p>
@@ -6326,8 +6549,8 @@
         </p:nvSpPr>
         <p:spPr>
           <a:xfrm>
-            <a:off x="5575144" y="1243755"/>
-            <a:ext cx="6523577" cy="1815882"/>
+            <a:off x="5575144" y="736377"/>
+            <a:ext cx="6616856" cy="1323439"/>
           </a:xfrm>
           <a:prstGeom prst="rect">
             <a:avLst/>
@@ -6345,18 +6568,11 @@
           <a:lstStyle/>
           <a:p>
             <a:r>
-              <a:rPr lang="en-US" sz="1600" dirty="0">
-                <a:latin typeface="Courier New" panose="02070309020205020404" pitchFamily="49" charset="0"/>
-                <a:cs typeface="Courier New" panose="02070309020205020404" pitchFamily="49" charset="0"/>
-              </a:rPr>
-              <a:t>shiny::</a:t>
-            </a:r>
-            <a:r>
               <a:rPr lang="en-US" sz="1600" dirty="0" err="1">
                 <a:latin typeface="Courier New" panose="02070309020205020404" pitchFamily="49" charset="0"/>
                 <a:cs typeface="Courier New" panose="02070309020205020404" pitchFamily="49" charset="0"/>
               </a:rPr>
-              <a:t>sliderInput</a:t>
+              <a:t>radioGroupButtons</a:t>
             </a:r>
             <a:r>
               <a:rPr lang="en-US" sz="1600" dirty="0">
@@ -6382,7 +6598,21 @@
                 <a:latin typeface="Courier New" panose="02070309020205020404" pitchFamily="49" charset="0"/>
                 <a:cs typeface="Courier New" panose="02070309020205020404" pitchFamily="49" charset="0"/>
               </a:rPr>
-              <a:t>inputId</a:t>
+              <a:t>input</a:t>
+            </a:r>
+            <a:r>
+              <a:rPr lang="en-US" sz="1600" dirty="0" err="1">
+                <a:latin typeface="Courier New" panose="02070309020205020404" pitchFamily="49" charset="0"/>
+                <a:cs typeface="Courier New" panose="02070309020205020404" pitchFamily="49" charset="0"/>
+              </a:rPr>
+              <a:t>Id</a:t>
+            </a:r>
+            <a:r>
+              <a:rPr lang="en-US" sz="1600" dirty="0">
+                <a:latin typeface="Courier New" panose="02070309020205020404" pitchFamily="49" charset="0"/>
+                <a:cs typeface="Courier New" panose="02070309020205020404" pitchFamily="49" charset="0"/>
+              </a:rPr>
+              <a:t> = </a:t>
             </a:r>
             <a:r>
               <a:rPr lang="en-US" sz="1600" b="1" dirty="0">
@@ -6392,7 +6622,27 @@
                 <a:latin typeface="Courier New" panose="02070309020205020404" pitchFamily="49" charset="0"/>
                 <a:cs typeface="Courier New" panose="02070309020205020404" pitchFamily="49" charset="0"/>
               </a:rPr>
-              <a:t> = "n"</a:t>
+              <a:t>"</a:t>
+            </a:r>
+            <a:r>
+              <a:rPr lang="en-US" sz="1600" b="1" dirty="0" err="1">
+                <a:solidFill>
+                  <a:srgbClr val="00B0F0"/>
+                </a:solidFill>
+                <a:latin typeface="Courier New" panose="02070309020205020404" pitchFamily="49" charset="0"/>
+                <a:cs typeface="Courier New" panose="02070309020205020404" pitchFamily="49" charset="0"/>
+              </a:rPr>
+              <a:t>age_group</a:t>
+            </a:r>
+            <a:r>
+              <a:rPr lang="en-US" sz="1600" b="1" dirty="0">
+                <a:solidFill>
+                  <a:srgbClr val="00B0F0"/>
+                </a:solidFill>
+                <a:latin typeface="Courier New" panose="02070309020205020404" pitchFamily="49" charset="0"/>
+                <a:cs typeface="Courier New" panose="02070309020205020404" pitchFamily="49" charset="0"/>
+              </a:rPr>
+              <a:t>"</a:t>
             </a:r>
             <a:r>
               <a:rPr lang="en-US" sz="1600" dirty="0">
@@ -6408,16 +6658,21 @@
                 <a:latin typeface="Courier New" panose="02070309020205020404" pitchFamily="49" charset="0"/>
                 <a:cs typeface="Courier New" panose="02070309020205020404" pitchFamily="49" charset="0"/>
               </a:rPr>
-              <a:t>  label = "# of Results:",</a:t>
-            </a:r>
-          </a:p>
-          <a:p>
+              <a:t>  choices = c("All", </a:t>
+            </a:r>
+            <a:r>
+              <a:rPr lang="en-US" sz="1600" dirty="0" err="1">
+                <a:latin typeface="Courier New" panose="02070309020205020404" pitchFamily="49" charset="0"/>
+                <a:cs typeface="Courier New" panose="02070309020205020404" pitchFamily="49" charset="0"/>
+              </a:rPr>
+              <a:t>age_groups</a:t>
+            </a:r>
             <a:r>
               <a:rPr lang="en-US" sz="1600" dirty="0">
                 <a:latin typeface="Courier New" panose="02070309020205020404" pitchFamily="49" charset="0"/>
                 <a:cs typeface="Courier New" panose="02070309020205020404" pitchFamily="49" charset="0"/>
               </a:rPr>
-              <a:t>  min = 1,</a:t>
+              <a:t>),</a:t>
             </a:r>
           </a:p>
           <a:p>
@@ -6426,7 +6681,7 @@
                 <a:latin typeface="Courier New" panose="02070309020205020404" pitchFamily="49" charset="0"/>
                 <a:cs typeface="Courier New" panose="02070309020205020404" pitchFamily="49" charset="0"/>
               </a:rPr>
-              <a:t>  max = 20,</a:t>
+              <a:t>  selected = "All“</a:t>
             </a:r>
           </a:p>
           <a:p>
@@ -6435,16 +6690,177 @@
                 <a:latin typeface="Courier New" panose="02070309020205020404" pitchFamily="49" charset="0"/>
                 <a:cs typeface="Courier New" panose="02070309020205020404" pitchFamily="49" charset="0"/>
               </a:rPr>
-              <a:t>  value = 10</a:t>
-            </a:r>
-          </a:p>
-          <a:p>
+              <a:t>)</a:t>
+            </a:r>
+          </a:p>
+        </p:txBody>
+      </p:sp>
+      <p:sp>
+        <p:nvSpPr>
+          <p:cNvPr id="6" name="TextBox 5">
+            <a:extLst>
+              <a:ext uri="{FF2B5EF4-FFF2-40B4-BE49-F238E27FC236}">
+                <a16:creationId xmlns:a16="http://schemas.microsoft.com/office/drawing/2014/main" id="{6015E623-FACA-45FD-A1D2-1DE351F7C17E}"/>
+              </a:ext>
+            </a:extLst>
+          </p:cNvPr>
+          <p:cNvSpPr txBox="1"/>
+          <p:nvPr/>
+        </p:nvSpPr>
+        <p:spPr>
+          <a:xfrm>
+            <a:off x="5575144" y="2241602"/>
+            <a:ext cx="6616856" cy="1815882"/>
+          </a:xfrm>
+          <a:prstGeom prst="rect">
+            <a:avLst/>
+          </a:prstGeom>
+          <a:solidFill>
+            <a:srgbClr val="F2F2F2"/>
+          </a:solidFill>
+        </p:spPr>
+        <p:txBody>
+          <a:bodyPr wrap="square" rtlCol="0">
+            <a:spAutoFit/>
+          </a:bodyPr>
+          <a:lstStyle/>
+          <a:p>
+            <a:r>
+              <a:rPr lang="en-US" sz="1600" b="1" dirty="0" err="1">
+                <a:solidFill>
+                  <a:schemeClr val="accent2">
+                    <a:lumMod val="75000"/>
+                  </a:schemeClr>
+                </a:solidFill>
+                <a:latin typeface="Courier New" panose="02070309020205020404" pitchFamily="49" charset="0"/>
+                <a:cs typeface="Courier New" panose="02070309020205020404" pitchFamily="49" charset="0"/>
+              </a:rPr>
+              <a:t>filtered_data</a:t>
+            </a:r>
+            <a:r>
+              <a:rPr lang="en-US" sz="1600" b="1" dirty="0">
+                <a:solidFill>
+                  <a:schemeClr val="accent2">
+                    <a:lumMod val="75000"/>
+                  </a:schemeClr>
+                </a:solidFill>
+                <a:latin typeface="Courier New" panose="02070309020205020404" pitchFamily="49" charset="0"/>
+                <a:cs typeface="Courier New" panose="02070309020205020404" pitchFamily="49" charset="0"/>
+              </a:rPr>
+              <a:t> </a:t>
+            </a:r>
             <a:r>
               <a:rPr lang="en-US" sz="1600" dirty="0">
                 <a:latin typeface="Courier New" panose="02070309020205020404" pitchFamily="49" charset="0"/>
                 <a:cs typeface="Courier New" panose="02070309020205020404" pitchFamily="49" charset="0"/>
               </a:rPr>
+              <a:t>&lt;- </a:t>
+            </a:r>
+            <a:r>
+              <a:rPr lang="en-US" sz="1600" b="1" dirty="0">
+                <a:latin typeface="Courier New" panose="02070309020205020404" pitchFamily="49" charset="0"/>
+                <a:cs typeface="Courier New" panose="02070309020205020404" pitchFamily="49" charset="0"/>
+              </a:rPr>
+              <a:t>reactive({</a:t>
+            </a:r>
+          </a:p>
+          <a:p>
+            <a:r>
+              <a:rPr lang="en-US" sz="1600" dirty="0">
+                <a:latin typeface="Courier New" panose="02070309020205020404" pitchFamily="49" charset="0"/>
+                <a:cs typeface="Courier New" panose="02070309020205020404" pitchFamily="49" charset="0"/>
+              </a:rPr>
+              <a:t>  if (</a:t>
+            </a:r>
+            <a:r>
+              <a:rPr lang="en-US" sz="1600" dirty="0" err="1">
+                <a:latin typeface="Courier New" panose="02070309020205020404" pitchFamily="49" charset="0"/>
+                <a:cs typeface="Courier New" panose="02070309020205020404" pitchFamily="49" charset="0"/>
+              </a:rPr>
+              <a:t>input$age_group</a:t>
+            </a:r>
+            <a:r>
+              <a:rPr lang="en-US" sz="1600" dirty="0">
+                <a:latin typeface="Courier New" panose="02070309020205020404" pitchFamily="49" charset="0"/>
+                <a:cs typeface="Courier New" panose="02070309020205020404" pitchFamily="49" charset="0"/>
+              </a:rPr>
+              <a:t> != "All") {</a:t>
+            </a:r>
+          </a:p>
+          <a:p>
+            <a:r>
+              <a:rPr lang="en-US" sz="1600" dirty="0">
+                <a:latin typeface="Courier New" panose="02070309020205020404" pitchFamily="49" charset="0"/>
+                <a:cs typeface="Courier New" panose="02070309020205020404" pitchFamily="49" charset="0"/>
+              </a:rPr>
+              <a:t>    filter(animals, </a:t>
+            </a:r>
+            <a:r>
+              <a:rPr lang="en-US" sz="1600" dirty="0" err="1">
+                <a:latin typeface="Courier New" panose="02070309020205020404" pitchFamily="49" charset="0"/>
+                <a:cs typeface="Courier New" panose="02070309020205020404" pitchFamily="49" charset="0"/>
+              </a:rPr>
+              <a:t>age_group</a:t>
+            </a:r>
+            <a:r>
+              <a:rPr lang="en-US" sz="1600" dirty="0">
+                <a:latin typeface="Courier New" panose="02070309020205020404" pitchFamily="49" charset="0"/>
+                <a:cs typeface="Courier New" panose="02070309020205020404" pitchFamily="49" charset="0"/>
+              </a:rPr>
+              <a:t> %in% </a:t>
+            </a:r>
+            <a:r>
+              <a:rPr lang="en-US" sz="1600" b="1" dirty="0" err="1">
+                <a:solidFill>
+                  <a:srgbClr val="00B0F0"/>
+                </a:solidFill>
+                <a:latin typeface="Courier New" panose="02070309020205020404" pitchFamily="49" charset="0"/>
+                <a:cs typeface="Courier New" panose="02070309020205020404" pitchFamily="49" charset="0"/>
+              </a:rPr>
+              <a:t>input$age_group</a:t>
+            </a:r>
+            <a:r>
+              <a:rPr lang="en-US" sz="1600" dirty="0">
+                <a:latin typeface="Courier New" panose="02070309020205020404" pitchFamily="49" charset="0"/>
+                <a:cs typeface="Courier New" panose="02070309020205020404" pitchFamily="49" charset="0"/>
+              </a:rPr>
               <a:t>)</a:t>
+            </a:r>
+          </a:p>
+          <a:p>
+            <a:r>
+              <a:rPr lang="en-US" sz="1600" dirty="0">
+                <a:latin typeface="Courier New" panose="02070309020205020404" pitchFamily="49" charset="0"/>
+                <a:cs typeface="Courier New" panose="02070309020205020404" pitchFamily="49" charset="0"/>
+              </a:rPr>
+              <a:t>  } else {</a:t>
+            </a:r>
+          </a:p>
+          <a:p>
+            <a:r>
+              <a:rPr lang="en-US" sz="1600" dirty="0">
+                <a:latin typeface="Courier New" panose="02070309020205020404" pitchFamily="49" charset="0"/>
+                <a:cs typeface="Courier New" panose="02070309020205020404" pitchFamily="49" charset="0"/>
+              </a:rPr>
+              <a:t>    animals</a:t>
+            </a:r>
+          </a:p>
+          <a:p>
+            <a:r>
+              <a:rPr lang="en-US" sz="1600" dirty="0">
+                <a:latin typeface="Courier New" panose="02070309020205020404" pitchFamily="49" charset="0"/>
+                <a:cs typeface="Courier New" panose="02070309020205020404" pitchFamily="49" charset="0"/>
+              </a:rPr>
+              <a:t>  }</a:t>
+            </a:r>
+          </a:p>
+          <a:p>
+            <a:r>
+              <a:rPr lang="en-US" sz="1600" b="1" dirty="0">
+                <a:latin typeface="Courier New" panose="02070309020205020404" pitchFamily="49" charset="0"/>
+                <a:cs typeface="Courier New" panose="02070309020205020404" pitchFamily="49" charset="0"/>
+              </a:rPr>
+              <a:t>})</a:t>
             </a:r>
           </a:p>
         </p:txBody>
@@ -6459,6 +6875,535 @@
   <p:clrMapOvr>
     <a:masterClrMapping/>
   </p:clrMapOvr>
+  <p:timing>
+    <p:tnLst>
+      <p:par>
+        <p:cTn id="1" dur="indefinite" restart="never" nodeType="tmRoot">
+          <p:childTnLst>
+            <p:seq concurrent="1" nextAc="seek">
+              <p:cTn id="2" dur="indefinite" nodeType="mainSeq">
+                <p:childTnLst>
+                  <p:par>
+                    <p:cTn id="3" fill="hold">
+                      <p:stCondLst>
+                        <p:cond delay="indefinite"/>
+                      </p:stCondLst>
+                      <p:childTnLst>
+                        <p:par>
+                          <p:cTn id="4" fill="hold">
+                            <p:stCondLst>
+                              <p:cond delay="0"/>
+                            </p:stCondLst>
+                            <p:childTnLst>
+                              <p:par>
+                                <p:cTn id="5" presetID="1" presetClass="entr" presetSubtype="0" fill="hold" nodeType="clickEffect">
+                                  <p:stCondLst>
+                                    <p:cond delay="0"/>
+                                  </p:stCondLst>
+                                  <p:childTnLst>
+                                    <p:set>
+                                      <p:cBhvr>
+                                        <p:cTn id="6" dur="1" fill="hold">
+                                          <p:stCondLst>
+                                            <p:cond delay="0"/>
+                                          </p:stCondLst>
+                                        </p:cTn>
+                                        <p:tgtEl>
+                                          <p:spTgt spid="3">
+                                            <p:txEl>
+                                              <p:pRg st="2" end="2"/>
+                                            </p:txEl>
+                                          </p:spTgt>
+                                        </p:tgtEl>
+                                        <p:attrNameLst>
+                                          <p:attrName>style.visibility</p:attrName>
+                                        </p:attrNameLst>
+                                      </p:cBhvr>
+                                      <p:to>
+                                        <p:strVal val="visible"/>
+                                      </p:to>
+                                    </p:set>
+                                  </p:childTnLst>
+                                </p:cTn>
+                              </p:par>
+                              <p:par>
+                                <p:cTn id="7" presetID="1" presetClass="entr" presetSubtype="0" fill="hold" nodeType="withEffect">
+                                  <p:stCondLst>
+                                    <p:cond delay="0"/>
+                                  </p:stCondLst>
+                                  <p:childTnLst>
+                                    <p:set>
+                                      <p:cBhvr>
+                                        <p:cTn id="8" dur="1" fill="hold">
+                                          <p:stCondLst>
+                                            <p:cond delay="0"/>
+                                          </p:stCondLst>
+                                        </p:cTn>
+                                        <p:tgtEl>
+                                          <p:spTgt spid="3">
+                                            <p:txEl>
+                                              <p:pRg st="3" end="3"/>
+                                            </p:txEl>
+                                          </p:spTgt>
+                                        </p:tgtEl>
+                                        <p:attrNameLst>
+                                          <p:attrName>style.visibility</p:attrName>
+                                        </p:attrNameLst>
+                                      </p:cBhvr>
+                                      <p:to>
+                                        <p:strVal val="visible"/>
+                                      </p:to>
+                                    </p:set>
+                                  </p:childTnLst>
+                                </p:cTn>
+                              </p:par>
+                              <p:par>
+                                <p:cTn id="9" presetID="1" presetClass="entr" presetSubtype="0" fill="hold" nodeType="withEffect">
+                                  <p:stCondLst>
+                                    <p:cond delay="0"/>
+                                  </p:stCondLst>
+                                  <p:childTnLst>
+                                    <p:set>
+                                      <p:cBhvr>
+                                        <p:cTn id="10" dur="1" fill="hold">
+                                          <p:stCondLst>
+                                            <p:cond delay="0"/>
+                                          </p:stCondLst>
+                                        </p:cTn>
+                                        <p:tgtEl>
+                                          <p:spTgt spid="3">
+                                            <p:txEl>
+                                              <p:pRg st="4" end="4"/>
+                                            </p:txEl>
+                                          </p:spTgt>
+                                        </p:tgtEl>
+                                        <p:attrNameLst>
+                                          <p:attrName>style.visibility</p:attrName>
+                                        </p:attrNameLst>
+                                      </p:cBhvr>
+                                      <p:to>
+                                        <p:strVal val="visible"/>
+                                      </p:to>
+                                    </p:set>
+                                  </p:childTnLst>
+                                </p:cTn>
+                              </p:par>
+                              <p:par>
+                                <p:cTn id="11" presetID="1" presetClass="entr" presetSubtype="0" fill="hold" nodeType="withEffect">
+                                  <p:stCondLst>
+                                    <p:cond delay="0"/>
+                                  </p:stCondLst>
+                                  <p:childTnLst>
+                                    <p:set>
+                                      <p:cBhvr>
+                                        <p:cTn id="12" dur="1" fill="hold">
+                                          <p:stCondLst>
+                                            <p:cond delay="0"/>
+                                          </p:stCondLst>
+                                        </p:cTn>
+                                        <p:tgtEl>
+                                          <p:spTgt spid="3">
+                                            <p:txEl>
+                                              <p:pRg st="5" end="5"/>
+                                            </p:txEl>
+                                          </p:spTgt>
+                                        </p:tgtEl>
+                                        <p:attrNameLst>
+                                          <p:attrName>style.visibility</p:attrName>
+                                        </p:attrNameLst>
+                                      </p:cBhvr>
+                                      <p:to>
+                                        <p:strVal val="visible"/>
+                                      </p:to>
+                                    </p:set>
+                                  </p:childTnLst>
+                                </p:cTn>
+                              </p:par>
+                              <p:par>
+                                <p:cTn id="13" presetID="1" presetClass="entr" presetSubtype="0" fill="hold" nodeType="withEffect">
+                                  <p:stCondLst>
+                                    <p:cond delay="0"/>
+                                  </p:stCondLst>
+                                  <p:childTnLst>
+                                    <p:set>
+                                      <p:cBhvr>
+                                        <p:cTn id="14" dur="1" fill="hold">
+                                          <p:stCondLst>
+                                            <p:cond delay="0"/>
+                                          </p:stCondLst>
+                                        </p:cTn>
+                                        <p:tgtEl>
+                                          <p:spTgt spid="3">
+                                            <p:txEl>
+                                              <p:pRg st="6" end="6"/>
+                                            </p:txEl>
+                                          </p:spTgt>
+                                        </p:tgtEl>
+                                        <p:attrNameLst>
+                                          <p:attrName>style.visibility</p:attrName>
+                                        </p:attrNameLst>
+                                      </p:cBhvr>
+                                      <p:to>
+                                        <p:strVal val="visible"/>
+                                      </p:to>
+                                    </p:set>
+                                  </p:childTnLst>
+                                </p:cTn>
+                              </p:par>
+                              <p:par>
+                                <p:cTn id="15" presetID="1" presetClass="entr" presetSubtype="0" fill="hold" nodeType="withEffect">
+                                  <p:stCondLst>
+                                    <p:cond delay="0"/>
+                                  </p:stCondLst>
+                                  <p:childTnLst>
+                                    <p:set>
+                                      <p:cBhvr>
+                                        <p:cTn id="16" dur="1" fill="hold">
+                                          <p:stCondLst>
+                                            <p:cond delay="0"/>
+                                          </p:stCondLst>
+                                        </p:cTn>
+                                        <p:tgtEl>
+                                          <p:spTgt spid="3">
+                                            <p:txEl>
+                                              <p:pRg st="7" end="7"/>
+                                            </p:txEl>
+                                          </p:spTgt>
+                                        </p:tgtEl>
+                                        <p:attrNameLst>
+                                          <p:attrName>style.visibility</p:attrName>
+                                        </p:attrNameLst>
+                                      </p:cBhvr>
+                                      <p:to>
+                                        <p:strVal val="visible"/>
+                                      </p:to>
+                                    </p:set>
+                                  </p:childTnLst>
+                                </p:cTn>
+                              </p:par>
+                            </p:childTnLst>
+                          </p:cTn>
+                        </p:par>
+                      </p:childTnLst>
+                    </p:cTn>
+                  </p:par>
+                  <p:par>
+                    <p:cTn id="17" fill="hold">
+                      <p:stCondLst>
+                        <p:cond delay="indefinite"/>
+                      </p:stCondLst>
+                      <p:childTnLst>
+                        <p:par>
+                          <p:cTn id="18" fill="hold">
+                            <p:stCondLst>
+                              <p:cond delay="0"/>
+                            </p:stCondLst>
+                            <p:childTnLst>
+                              <p:par>
+                                <p:cTn id="19" presetID="1" presetClass="entr" presetSubtype="0" fill="hold" grpId="0" nodeType="clickEffect">
+                                  <p:stCondLst>
+                                    <p:cond delay="0"/>
+                                  </p:stCondLst>
+                                  <p:childTnLst>
+                                    <p:set>
+                                      <p:cBhvr>
+                                        <p:cTn id="20" dur="1" fill="hold">
+                                          <p:stCondLst>
+                                            <p:cond delay="0"/>
+                                          </p:stCondLst>
+                                        </p:cTn>
+                                        <p:tgtEl>
+                                          <p:spTgt spid="5"/>
+                                        </p:tgtEl>
+                                        <p:attrNameLst>
+                                          <p:attrName>style.visibility</p:attrName>
+                                        </p:attrNameLst>
+                                      </p:cBhvr>
+                                      <p:to>
+                                        <p:strVal val="visible"/>
+                                      </p:to>
+                                    </p:set>
+                                  </p:childTnLst>
+                                </p:cTn>
+                              </p:par>
+                            </p:childTnLst>
+                          </p:cTn>
+                        </p:par>
+                      </p:childTnLst>
+                    </p:cTn>
+                  </p:par>
+                  <p:par>
+                    <p:cTn id="21" fill="hold">
+                      <p:stCondLst>
+                        <p:cond delay="indefinite"/>
+                      </p:stCondLst>
+                      <p:childTnLst>
+                        <p:par>
+                          <p:cTn id="22" fill="hold">
+                            <p:stCondLst>
+                              <p:cond delay="0"/>
+                            </p:stCondLst>
+                            <p:childTnLst>
+                              <p:par>
+                                <p:cTn id="23" presetID="1" presetClass="entr" presetSubtype="0" fill="hold" nodeType="clickEffect">
+                                  <p:stCondLst>
+                                    <p:cond delay="0"/>
+                                  </p:stCondLst>
+                                  <p:childTnLst>
+                                    <p:set>
+                                      <p:cBhvr>
+                                        <p:cTn id="24" dur="1" fill="hold">
+                                          <p:stCondLst>
+                                            <p:cond delay="0"/>
+                                          </p:stCondLst>
+                                        </p:cTn>
+                                        <p:tgtEl>
+                                          <p:spTgt spid="3">
+                                            <p:txEl>
+                                              <p:pRg st="9" end="9"/>
+                                            </p:txEl>
+                                          </p:spTgt>
+                                        </p:tgtEl>
+                                        <p:attrNameLst>
+                                          <p:attrName>style.visibility</p:attrName>
+                                        </p:attrNameLst>
+                                      </p:cBhvr>
+                                      <p:to>
+                                        <p:strVal val="visible"/>
+                                      </p:to>
+                                    </p:set>
+                                  </p:childTnLst>
+                                </p:cTn>
+                              </p:par>
+                              <p:par>
+                                <p:cTn id="25" presetID="1" presetClass="entr" presetSubtype="0" fill="hold" nodeType="withEffect">
+                                  <p:stCondLst>
+                                    <p:cond delay="0"/>
+                                  </p:stCondLst>
+                                  <p:childTnLst>
+                                    <p:set>
+                                      <p:cBhvr>
+                                        <p:cTn id="26" dur="1" fill="hold">
+                                          <p:stCondLst>
+                                            <p:cond delay="0"/>
+                                          </p:stCondLst>
+                                        </p:cTn>
+                                        <p:tgtEl>
+                                          <p:spTgt spid="3">
+                                            <p:txEl>
+                                              <p:pRg st="10" end="10"/>
+                                            </p:txEl>
+                                          </p:spTgt>
+                                        </p:tgtEl>
+                                        <p:attrNameLst>
+                                          <p:attrName>style.visibility</p:attrName>
+                                        </p:attrNameLst>
+                                      </p:cBhvr>
+                                      <p:to>
+                                        <p:strVal val="visible"/>
+                                      </p:to>
+                                    </p:set>
+                                  </p:childTnLst>
+                                </p:cTn>
+                              </p:par>
+                              <p:par>
+                                <p:cTn id="27" presetID="1" presetClass="entr" presetSubtype="0" fill="hold" nodeType="withEffect">
+                                  <p:stCondLst>
+                                    <p:cond delay="0"/>
+                                  </p:stCondLst>
+                                  <p:childTnLst>
+                                    <p:set>
+                                      <p:cBhvr>
+                                        <p:cTn id="28" dur="1" fill="hold">
+                                          <p:stCondLst>
+                                            <p:cond delay="0"/>
+                                          </p:stCondLst>
+                                        </p:cTn>
+                                        <p:tgtEl>
+                                          <p:spTgt spid="3">
+                                            <p:txEl>
+                                              <p:pRg st="11" end="11"/>
+                                            </p:txEl>
+                                          </p:spTgt>
+                                        </p:tgtEl>
+                                        <p:attrNameLst>
+                                          <p:attrName>style.visibility</p:attrName>
+                                        </p:attrNameLst>
+                                      </p:cBhvr>
+                                      <p:to>
+                                        <p:strVal val="visible"/>
+                                      </p:to>
+                                    </p:set>
+                                  </p:childTnLst>
+                                </p:cTn>
+                              </p:par>
+                              <p:par>
+                                <p:cTn id="29" presetID="1" presetClass="entr" presetSubtype="0" fill="hold" nodeType="withEffect">
+                                  <p:stCondLst>
+                                    <p:cond delay="0"/>
+                                  </p:stCondLst>
+                                  <p:childTnLst>
+                                    <p:set>
+                                      <p:cBhvr>
+                                        <p:cTn id="30" dur="1" fill="hold">
+                                          <p:stCondLst>
+                                            <p:cond delay="0"/>
+                                          </p:stCondLst>
+                                        </p:cTn>
+                                        <p:tgtEl>
+                                          <p:spTgt spid="3">
+                                            <p:txEl>
+                                              <p:pRg st="12" end="12"/>
+                                            </p:txEl>
+                                          </p:spTgt>
+                                        </p:tgtEl>
+                                        <p:attrNameLst>
+                                          <p:attrName>style.visibility</p:attrName>
+                                        </p:attrNameLst>
+                                      </p:cBhvr>
+                                      <p:to>
+                                        <p:strVal val="visible"/>
+                                      </p:to>
+                                    </p:set>
+                                  </p:childTnLst>
+                                </p:cTn>
+                              </p:par>
+                              <p:par>
+                                <p:cTn id="31" presetID="1" presetClass="entr" presetSubtype="0" fill="hold" nodeType="withEffect">
+                                  <p:stCondLst>
+                                    <p:cond delay="0"/>
+                                  </p:stCondLst>
+                                  <p:childTnLst>
+                                    <p:set>
+                                      <p:cBhvr>
+                                        <p:cTn id="32" dur="1" fill="hold">
+                                          <p:stCondLst>
+                                            <p:cond delay="0"/>
+                                          </p:stCondLst>
+                                        </p:cTn>
+                                        <p:tgtEl>
+                                          <p:spTgt spid="3">
+                                            <p:txEl>
+                                              <p:pRg st="13" end="13"/>
+                                            </p:txEl>
+                                          </p:spTgt>
+                                        </p:tgtEl>
+                                        <p:attrNameLst>
+                                          <p:attrName>style.visibility</p:attrName>
+                                        </p:attrNameLst>
+                                      </p:cBhvr>
+                                      <p:to>
+                                        <p:strVal val="visible"/>
+                                      </p:to>
+                                    </p:set>
+                                  </p:childTnLst>
+                                </p:cTn>
+                              </p:par>
+                            </p:childTnLst>
+                          </p:cTn>
+                        </p:par>
+                      </p:childTnLst>
+                    </p:cTn>
+                  </p:par>
+                  <p:par>
+                    <p:cTn id="33" fill="hold">
+                      <p:stCondLst>
+                        <p:cond delay="indefinite"/>
+                      </p:stCondLst>
+                      <p:childTnLst>
+                        <p:par>
+                          <p:cTn id="34" fill="hold">
+                            <p:stCondLst>
+                              <p:cond delay="0"/>
+                            </p:stCondLst>
+                            <p:childTnLst>
+                              <p:par>
+                                <p:cTn id="35" presetID="1" presetClass="entr" presetSubtype="0" fill="hold" grpId="0" nodeType="clickEffect">
+                                  <p:stCondLst>
+                                    <p:cond delay="0"/>
+                                  </p:stCondLst>
+                                  <p:childTnLst>
+                                    <p:set>
+                                      <p:cBhvr>
+                                        <p:cTn id="36" dur="1" fill="hold">
+                                          <p:stCondLst>
+                                            <p:cond delay="0"/>
+                                          </p:stCondLst>
+                                        </p:cTn>
+                                        <p:tgtEl>
+                                          <p:spTgt spid="6"/>
+                                        </p:tgtEl>
+                                        <p:attrNameLst>
+                                          <p:attrName>style.visibility</p:attrName>
+                                        </p:attrNameLst>
+                                      </p:cBhvr>
+                                      <p:to>
+                                        <p:strVal val="visible"/>
+                                      </p:to>
+                                    </p:set>
+                                  </p:childTnLst>
+                                </p:cTn>
+                              </p:par>
+                              <p:par>
+                                <p:cTn id="37" presetID="1" presetClass="entr" presetSubtype="0" fill="hold" grpId="0" nodeType="withEffect">
+                                  <p:stCondLst>
+                                    <p:cond delay="0"/>
+                                  </p:stCondLst>
+                                  <p:childTnLst>
+                                    <p:set>
+                                      <p:cBhvr>
+                                        <p:cTn id="38" dur="1" fill="hold">
+                                          <p:stCondLst>
+                                            <p:cond delay="0"/>
+                                          </p:stCondLst>
+                                        </p:cTn>
+                                        <p:tgtEl>
+                                          <p:spTgt spid="4"/>
+                                        </p:tgtEl>
+                                        <p:attrNameLst>
+                                          <p:attrName>style.visibility</p:attrName>
+                                        </p:attrNameLst>
+                                      </p:cBhvr>
+                                      <p:to>
+                                        <p:strVal val="visible"/>
+                                      </p:to>
+                                    </p:set>
+                                  </p:childTnLst>
+                                </p:cTn>
+                              </p:par>
+                            </p:childTnLst>
+                          </p:cTn>
+                        </p:par>
+                      </p:childTnLst>
+                    </p:cTn>
+                  </p:par>
+                </p:childTnLst>
+              </p:cTn>
+              <p:prevCondLst>
+                <p:cond evt="onPrev" delay="0">
+                  <p:tgtEl>
+                    <p:sldTgt/>
+                  </p:tgtEl>
+                </p:cond>
+              </p:prevCondLst>
+              <p:nextCondLst>
+                <p:cond evt="onNext" delay="0">
+                  <p:tgtEl>
+                    <p:sldTgt/>
+                  </p:tgtEl>
+                </p:cond>
+              </p:nextCondLst>
+            </p:seq>
+          </p:childTnLst>
+        </p:cTn>
+      </p:par>
+    </p:tnLst>
+    <p:bldLst>
+      <p:bldP spid="4" grpId="0" animBg="1"/>
+      <p:bldP spid="5" grpId="0" animBg="1"/>
+      <p:bldP spid="6" grpId="0" animBg="1"/>
+    </p:bldLst>
+  </p:timing>
 </p:sld>
 </file>
 
@@ -7549,7 +8494,7 @@
           <p:cNvPr id="2" name="Title 1">
             <a:extLst>
               <a:ext uri="{FF2B5EF4-FFF2-40B4-BE49-F238E27FC236}">
-                <a16:creationId xmlns:a16="http://schemas.microsoft.com/office/drawing/2014/main" id="{D522F9FB-04B6-4E41-A38C-C4A555691525}"/>
+                <a16:creationId xmlns:a16="http://schemas.microsoft.com/office/drawing/2014/main" id="{2746A089-FCC5-4CD6-9B18-37588929C2A7}"/>
               </a:ext>
             </a:extLst>
           </p:cNvPr>
@@ -7566,12 +8511,8 @@
           <a:lstStyle/>
           <a:p>
             <a:r>
-              <a:rPr lang="en-US" dirty="0" err="1"/>
-              <a:t>shinyobjects</a:t>
-            </a:r>
-            <a:r>
               <a:rPr lang="en-US" dirty="0"/>
-              <a:t> workflow</a:t>
+              <a:t>Good to know</a:t>
             </a:r>
           </a:p>
         </p:txBody>
@@ -7581,7 +8522,7 @@
           <p:cNvPr id="3" name="Content Placeholder 2">
             <a:extLst>
               <a:ext uri="{FF2B5EF4-FFF2-40B4-BE49-F238E27FC236}">
-                <a16:creationId xmlns:a16="http://schemas.microsoft.com/office/drawing/2014/main" id="{BB7360C4-80E9-4474-A969-9771EF720C56}"/>
+                <a16:creationId xmlns:a16="http://schemas.microsoft.com/office/drawing/2014/main" id="{1228CCD3-3986-4996-A456-4F5961D90432}"/>
               </a:ext>
             </a:extLst>
           </p:cNvPr>
@@ -7592,160 +8533,932 @@
             <p:ph idx="1"/>
           </p:nvPr>
         </p:nvSpPr>
-        <p:spPr/>
+        <p:spPr>
+          <a:xfrm>
+            <a:off x="838200" y="1825625"/>
+            <a:ext cx="4979894" cy="4351338"/>
+          </a:xfrm>
+        </p:spPr>
         <p:txBody>
           <a:bodyPr>
-            <a:normAutofit fontScale="77500" lnSpcReduction="20000"/>
+            <a:normAutofit lnSpcReduction="10000"/>
           </a:bodyPr>
           <a:lstStyle/>
           <a:p>
             <a:r>
               <a:rPr lang="en-US" dirty="0">
+                <a:solidFill>
+                  <a:schemeClr val="tx1">
+                    <a:lumMod val="50000"/>
+                    <a:lumOff val="50000"/>
+                  </a:schemeClr>
+                </a:solidFill>
                 <a:latin typeface="+mj-lt"/>
               </a:rPr>
-              <a:t>create a </a:t>
-            </a:r>
-            <a:r>
-              <a:rPr lang="en-US" b="1" dirty="0">
-                <a:latin typeface="+mj-lt"/>
-              </a:rPr>
-              <a:t>dummy input </a:t>
+              <a:t>multistep logic should go in </a:t>
             </a:r>
             <a:r>
               <a:rPr lang="en-US" dirty="0">
                 <a:latin typeface="+mj-lt"/>
               </a:rPr>
-              <a:t>object</a:t>
+              <a:t>{…}</a:t>
             </a:r>
           </a:p>
           <a:p>
             <a:endParaRPr lang="en-US" dirty="0">
+              <a:solidFill>
+                <a:schemeClr val="tx1">
+                  <a:lumMod val="50000"/>
+                  <a:lumOff val="50000"/>
+                </a:schemeClr>
+              </a:solidFill>
               <a:latin typeface="+mj-lt"/>
             </a:endParaRPr>
           </a:p>
           <a:p>
             <a:r>
-              <a:rPr lang="en-US" b="1" dirty="0" err="1">
+              <a:rPr lang="en-US" dirty="0">
+                <a:solidFill>
+                  <a:schemeClr val="tx1">
+                    <a:lumMod val="50000"/>
+                    <a:lumOff val="50000"/>
+                  </a:schemeClr>
+                </a:solidFill>
                 <a:latin typeface="+mj-lt"/>
               </a:rPr>
-              <a:t>load_reactive_objects</a:t>
-            </a:r>
-            <a:r>
-              <a:rPr lang="en-US" b="1" dirty="0">
-                <a:latin typeface="+mj-lt"/>
-              </a:rPr>
-              <a:t>()</a:t>
-            </a:r>
-          </a:p>
-          <a:p>
-            <a:pPr lvl="1"/>
+              <a:t>If </a:t>
+            </a:r>
             <a:r>
               <a:rPr lang="en-US" dirty="0">
                 <a:latin typeface="+mj-lt"/>
               </a:rPr>
-              <a:t>Changes reactive objects to static objects in your global environment </a:t>
-            </a:r>
-          </a:p>
-          <a:p>
-            <a:pPr lvl="1"/>
+              <a:t>nothing is selected</a:t>
+            </a:r>
+            <a:r>
+              <a:rPr lang="en-US" dirty="0">
+                <a:solidFill>
+                  <a:schemeClr val="tx1">
+                    <a:lumMod val="50000"/>
+                    <a:lumOff val="50000"/>
+                  </a:schemeClr>
+                </a:solidFill>
+                <a:latin typeface="+mj-lt"/>
+              </a:rPr>
+              <a:t>, </a:t>
+            </a:r>
+            <a:r>
+              <a:rPr lang="en-US" dirty="0" err="1">
+                <a:solidFill>
+                  <a:schemeClr val="tx1">
+                    <a:lumMod val="50000"/>
+                    <a:lumOff val="50000"/>
+                  </a:schemeClr>
+                </a:solidFill>
+                <a:latin typeface="+mj-lt"/>
+              </a:rPr>
+              <a:t>input$x</a:t>
+            </a:r>
+            <a:r>
+              <a:rPr lang="en-US" dirty="0">
+                <a:solidFill>
+                  <a:schemeClr val="tx1">
+                    <a:lumMod val="50000"/>
+                    <a:lumOff val="50000"/>
+                  </a:schemeClr>
+                </a:solidFill>
+                <a:latin typeface="+mj-lt"/>
+              </a:rPr>
+              <a:t> will return </a:t>
+            </a:r>
             <a:r>
               <a:rPr lang="en-US" dirty="0">
                 <a:latin typeface="+mj-lt"/>
               </a:rPr>
-              <a:t>Entirely under the hood</a:t>
+              <a:t>NULL</a:t>
             </a:r>
           </a:p>
           <a:p>
             <a:endParaRPr lang="en-US" dirty="0">
+              <a:solidFill>
+                <a:schemeClr val="tx1">
+                  <a:lumMod val="50000"/>
+                  <a:lumOff val="50000"/>
+                </a:schemeClr>
+              </a:solidFill>
               <a:latin typeface="+mj-lt"/>
             </a:endParaRPr>
           </a:p>
           <a:p>
             <a:r>
-              <a:rPr lang="en-US" b="1" dirty="0" err="1">
-                <a:latin typeface="+mj-lt"/>
-              </a:rPr>
-              <a:t>convert_selection</a:t>
-            </a:r>
-            <a:r>
-              <a:rPr lang="en-US" b="1" dirty="0">
-                <a:latin typeface="+mj-lt"/>
-              </a:rPr>
-              <a:t>()</a:t>
-            </a:r>
-          </a:p>
-          <a:p>
-            <a:pPr lvl="1"/>
-            <a:r>
               <a:rPr lang="en-US" dirty="0">
                 <a:latin typeface="+mj-lt"/>
               </a:rPr>
-              <a:t>converts just the code highlighted in source pane</a:t>
+              <a:t>### when Row </a:t>
+            </a:r>
+            <a:r>
+              <a:rPr lang="en-US" dirty="0">
+                <a:solidFill>
+                  <a:schemeClr val="tx1">
+                    <a:lumMod val="50000"/>
+                    <a:lumOff val="50000"/>
+                  </a:schemeClr>
+                </a:solidFill>
+                <a:latin typeface="+mj-lt"/>
+              </a:rPr>
+              <a:t>will put them next to each other</a:t>
             </a:r>
           </a:p>
           <a:p>
             <a:endParaRPr lang="en-US" dirty="0">
+              <a:solidFill>
+                <a:schemeClr val="tx1">
+                  <a:lumMod val="50000"/>
+                  <a:lumOff val="50000"/>
+                </a:schemeClr>
+              </a:solidFill>
               <a:latin typeface="+mj-lt"/>
             </a:endParaRPr>
           </a:p>
           <a:p>
             <a:r>
-              <a:rPr lang="en-US" b="1" dirty="0" err="1">
-                <a:latin typeface="+mj-lt"/>
-              </a:rPr>
-              <a:t>view_ui</a:t>
-            </a:r>
-            <a:r>
-              <a:rPr lang="en-US" b="1" dirty="0">
-                <a:latin typeface="+mj-lt"/>
-              </a:rPr>
-              <a:t>()</a:t>
-            </a:r>
-          </a:p>
-          <a:p>
-            <a:pPr lvl="1"/>
-            <a:r>
               <a:rPr lang="en-US" dirty="0">
                 <a:latin typeface="+mj-lt"/>
               </a:rPr>
-              <a:t>see what UI components will look like</a:t>
-            </a:r>
-          </a:p>
-          <a:p>
-            <a:pPr lvl="1"/>
-            <a:endParaRPr lang="en-US" dirty="0">
-              <a:latin typeface="+mj-lt"/>
+              <a:t>### when Column </a:t>
+            </a:r>
+            <a:r>
+              <a:rPr lang="en-US" dirty="0">
+                <a:solidFill>
+                  <a:schemeClr val="tx1">
+                    <a:lumMod val="50000"/>
+                    <a:lumOff val="50000"/>
+                  </a:schemeClr>
+                </a:solidFill>
+                <a:latin typeface="+mj-lt"/>
+              </a:rPr>
+              <a:t>will stack them</a:t>
+            </a:r>
+          </a:p>
+        </p:txBody>
+      </p:sp>
+      <p:sp>
+        <p:nvSpPr>
+          <p:cNvPr id="4" name="TextBox 3">
+            <a:extLst>
+              <a:ext uri="{FF2B5EF4-FFF2-40B4-BE49-F238E27FC236}">
+                <a16:creationId xmlns:a16="http://schemas.microsoft.com/office/drawing/2014/main" id="{2E08B5C7-3AC9-4869-9A8A-5A85DD493910}"/>
+              </a:ext>
+            </a:extLst>
+          </p:cNvPr>
+          <p:cNvSpPr txBox="1"/>
+          <p:nvPr/>
+        </p:nvSpPr>
+        <p:spPr>
+          <a:xfrm>
+            <a:off x="5981486" y="1204633"/>
+            <a:ext cx="5489889" cy="2062103"/>
+          </a:xfrm>
+          <a:prstGeom prst="rect">
+            <a:avLst/>
+          </a:prstGeom>
+          <a:solidFill>
+            <a:schemeClr val="bg1">
+              <a:lumMod val="95000"/>
+            </a:schemeClr>
+          </a:solidFill>
+        </p:spPr>
+        <p:txBody>
+          <a:bodyPr wrap="square" rtlCol="0">
+            <a:spAutoFit/>
+          </a:bodyPr>
+          <a:lstStyle/>
+          <a:p>
+            <a:r>
+              <a:rPr lang="en-US" sz="1600" dirty="0" err="1">
+                <a:latin typeface="Courier New" panose="02070309020205020404" pitchFamily="49" charset="0"/>
+                <a:cs typeface="Courier New" panose="02070309020205020404" pitchFamily="49" charset="0"/>
+              </a:rPr>
+              <a:t>plotly</a:t>
+            </a:r>
+            <a:r>
+              <a:rPr lang="en-US" sz="1600" dirty="0">
+                <a:latin typeface="Courier New" panose="02070309020205020404" pitchFamily="49" charset="0"/>
+                <a:cs typeface="Courier New" panose="02070309020205020404" pitchFamily="49" charset="0"/>
+              </a:rPr>
+              <a:t>::</a:t>
+            </a:r>
+            <a:r>
+              <a:rPr lang="en-US" sz="1600" dirty="0" err="1">
+                <a:latin typeface="Courier New" panose="02070309020205020404" pitchFamily="49" charset="0"/>
+                <a:cs typeface="Courier New" panose="02070309020205020404" pitchFamily="49" charset="0"/>
+              </a:rPr>
+              <a:t>renderPlotly</a:t>
+            </a:r>
+            <a:r>
+              <a:rPr lang="en-US" sz="1600" b="1" dirty="0">
+                <a:solidFill>
+                  <a:srgbClr val="0070C0"/>
+                </a:solidFill>
+                <a:latin typeface="Courier New" panose="02070309020205020404" pitchFamily="49" charset="0"/>
+                <a:cs typeface="Courier New" panose="02070309020205020404" pitchFamily="49" charset="0"/>
+              </a:rPr>
+              <a:t>({</a:t>
+            </a:r>
+            <a:r>
+              <a:rPr lang="en-US" sz="1600" b="1" dirty="0">
+                <a:latin typeface="Courier New" panose="02070309020205020404" pitchFamily="49" charset="0"/>
+                <a:cs typeface="Courier New" panose="02070309020205020404" pitchFamily="49" charset="0"/>
+              </a:rPr>
+              <a:t> </a:t>
+            </a:r>
+            <a:r>
+              <a:rPr lang="en-US" sz="1600" dirty="0">
+                <a:solidFill>
+                  <a:schemeClr val="tx1">
+                    <a:lumMod val="50000"/>
+                    <a:lumOff val="50000"/>
+                  </a:schemeClr>
+                </a:solidFill>
+                <a:latin typeface="Courier New" panose="02070309020205020404" pitchFamily="49" charset="0"/>
+                <a:cs typeface="Courier New" panose="02070309020205020404" pitchFamily="49" charset="0"/>
+              </a:rPr>
+              <a:t># has {}</a:t>
+            </a:r>
+          </a:p>
+          <a:p>
+            <a:r>
+              <a:rPr lang="en-US" sz="1600" dirty="0">
+                <a:latin typeface="Courier New" panose="02070309020205020404" pitchFamily="49" charset="0"/>
+                <a:cs typeface="Courier New" panose="02070309020205020404" pitchFamily="49" charset="0"/>
+              </a:rPr>
+              <a:t>  p &lt;-</a:t>
+            </a:r>
+          </a:p>
+          <a:p>
+            <a:r>
+              <a:rPr lang="en-US" sz="1600" dirty="0">
+                <a:latin typeface="Courier New" panose="02070309020205020404" pitchFamily="49" charset="0"/>
+                <a:cs typeface="Courier New" panose="02070309020205020404" pitchFamily="49" charset="0"/>
+              </a:rPr>
+              <a:t>    </a:t>
+            </a:r>
+            <a:r>
+              <a:rPr lang="en-US" sz="1600" dirty="0" err="1">
+                <a:latin typeface="Courier New" panose="02070309020205020404" pitchFamily="49" charset="0"/>
+                <a:cs typeface="Courier New" panose="02070309020205020404" pitchFamily="49" charset="0"/>
+              </a:rPr>
+              <a:t>filtered_data</a:t>
+            </a:r>
+            <a:r>
+              <a:rPr lang="en-US" sz="1600" dirty="0">
+                <a:latin typeface="Courier New" panose="02070309020205020404" pitchFamily="49" charset="0"/>
+                <a:cs typeface="Courier New" panose="02070309020205020404" pitchFamily="49" charset="0"/>
+              </a:rPr>
+              <a:t>() %&gt;%</a:t>
+            </a:r>
+          </a:p>
+          <a:p>
+            <a:r>
+              <a:rPr lang="en-US" sz="1600" dirty="0">
+                <a:latin typeface="Courier New" panose="02070309020205020404" pitchFamily="49" charset="0"/>
+                <a:cs typeface="Courier New" panose="02070309020205020404" pitchFamily="49" charset="0"/>
+              </a:rPr>
+              <a:t>    </a:t>
+            </a:r>
+            <a:r>
+              <a:rPr lang="en-US" sz="1600" dirty="0" err="1">
+                <a:latin typeface="Courier New" panose="02070309020205020404" pitchFamily="49" charset="0"/>
+                <a:cs typeface="Courier New" panose="02070309020205020404" pitchFamily="49" charset="0"/>
+              </a:rPr>
+              <a:t>ggplot</a:t>
+            </a:r>
+            <a:r>
+              <a:rPr lang="en-US" sz="1600" dirty="0">
+                <a:latin typeface="Courier New" panose="02070309020205020404" pitchFamily="49" charset="0"/>
+                <a:cs typeface="Courier New" panose="02070309020205020404" pitchFamily="49" charset="0"/>
+              </a:rPr>
+              <a:t>(</a:t>
+            </a:r>
+            <a:r>
+              <a:rPr lang="en-US" sz="1600" dirty="0" err="1">
+                <a:latin typeface="Courier New" panose="02070309020205020404" pitchFamily="49" charset="0"/>
+                <a:cs typeface="Courier New" panose="02070309020205020404" pitchFamily="49" charset="0"/>
+              </a:rPr>
+              <a:t>aes</a:t>
+            </a:r>
+            <a:r>
+              <a:rPr lang="en-US" sz="1600" dirty="0">
+                <a:latin typeface="Courier New" panose="02070309020205020404" pitchFamily="49" charset="0"/>
+                <a:cs typeface="Courier New" panose="02070309020205020404" pitchFamily="49" charset="0"/>
+              </a:rPr>
+              <a:t>(y = breed, fill = type)) +</a:t>
+            </a:r>
+          </a:p>
+          <a:p>
+            <a:r>
+              <a:rPr lang="en-US" sz="1600" dirty="0">
+                <a:latin typeface="Courier New" panose="02070309020205020404" pitchFamily="49" charset="0"/>
+                <a:cs typeface="Courier New" panose="02070309020205020404" pitchFamily="49" charset="0"/>
+              </a:rPr>
+              <a:t>    </a:t>
+            </a:r>
+            <a:r>
+              <a:rPr lang="en-US" sz="1600" dirty="0" err="1">
+                <a:latin typeface="Courier New" panose="02070309020205020404" pitchFamily="49" charset="0"/>
+                <a:cs typeface="Courier New" panose="02070309020205020404" pitchFamily="49" charset="0"/>
+              </a:rPr>
+              <a:t>geom_bar</a:t>
+            </a:r>
+            <a:r>
+              <a:rPr lang="en-US" sz="1600" dirty="0">
+                <a:latin typeface="Courier New" panose="02070309020205020404" pitchFamily="49" charset="0"/>
+                <a:cs typeface="Courier New" panose="02070309020205020404" pitchFamily="49" charset="0"/>
+              </a:rPr>
+              <a:t>()</a:t>
+            </a:r>
+          </a:p>
+          <a:p>
+            <a:endParaRPr lang="en-US" sz="1600" dirty="0">
+              <a:latin typeface="Courier New" panose="02070309020205020404" pitchFamily="49" charset="0"/>
+              <a:cs typeface="Courier New" panose="02070309020205020404" pitchFamily="49" charset="0"/>
             </a:endParaRPr>
           </a:p>
           <a:p>
             <a:r>
-              <a:rPr lang="en-US" dirty="0">
-                <a:latin typeface="+mj-lt"/>
-                <a:hlinkClick r:id="rId2"/>
-              </a:rPr>
-              <a:t>https://rjake.github.io/shinyobjects/</a:t>
-            </a:r>
-            <a:endParaRPr lang="en-US" dirty="0">
-              <a:latin typeface="+mj-lt"/>
+              <a:rPr lang="en-US" sz="1600" dirty="0">
+                <a:latin typeface="Courier New" panose="02070309020205020404" pitchFamily="49" charset="0"/>
+                <a:cs typeface="Courier New" panose="02070309020205020404" pitchFamily="49" charset="0"/>
+              </a:rPr>
+              <a:t>  </a:t>
+            </a:r>
+            <a:r>
+              <a:rPr lang="en-US" sz="1600" dirty="0" err="1">
+                <a:latin typeface="Courier New" panose="02070309020205020404" pitchFamily="49" charset="0"/>
+                <a:cs typeface="Courier New" panose="02070309020205020404" pitchFamily="49" charset="0"/>
+              </a:rPr>
+              <a:t>plotly</a:t>
+            </a:r>
+            <a:r>
+              <a:rPr lang="en-US" sz="1600" dirty="0">
+                <a:latin typeface="Courier New" panose="02070309020205020404" pitchFamily="49" charset="0"/>
+                <a:cs typeface="Courier New" panose="02070309020205020404" pitchFamily="49" charset="0"/>
+              </a:rPr>
+              <a:t>::</a:t>
+            </a:r>
+            <a:r>
+              <a:rPr lang="en-US" sz="1600" dirty="0" err="1">
+                <a:latin typeface="Courier New" panose="02070309020205020404" pitchFamily="49" charset="0"/>
+                <a:cs typeface="Courier New" panose="02070309020205020404" pitchFamily="49" charset="0"/>
+              </a:rPr>
+              <a:t>ggplotly</a:t>
+            </a:r>
+            <a:r>
+              <a:rPr lang="en-US" sz="1600" dirty="0">
+                <a:latin typeface="Courier New" panose="02070309020205020404" pitchFamily="49" charset="0"/>
+                <a:cs typeface="Courier New" panose="02070309020205020404" pitchFamily="49" charset="0"/>
+              </a:rPr>
+              <a:t>(p)</a:t>
+            </a:r>
+          </a:p>
+          <a:p>
+            <a:r>
+              <a:rPr lang="en-US" sz="1600" b="1" dirty="0">
+                <a:solidFill>
+                  <a:srgbClr val="0070C0"/>
+                </a:solidFill>
+                <a:latin typeface="Courier New" panose="02070309020205020404" pitchFamily="49" charset="0"/>
+                <a:cs typeface="Courier New" panose="02070309020205020404" pitchFamily="49" charset="0"/>
+              </a:rPr>
+              <a:t>})</a:t>
+            </a:r>
+          </a:p>
+        </p:txBody>
+      </p:sp>
+      <p:sp>
+        <p:nvSpPr>
+          <p:cNvPr id="5" name="TextBox 4">
+            <a:extLst>
+              <a:ext uri="{FF2B5EF4-FFF2-40B4-BE49-F238E27FC236}">
+                <a16:creationId xmlns:a16="http://schemas.microsoft.com/office/drawing/2014/main" id="{A0D3FAB2-DA1B-4C2D-BF35-64B310AEDDEE}"/>
+              </a:ext>
+            </a:extLst>
+          </p:cNvPr>
+          <p:cNvSpPr txBox="1"/>
+          <p:nvPr/>
+        </p:nvSpPr>
+        <p:spPr>
+          <a:xfrm>
+            <a:off x="5981486" y="3733136"/>
+            <a:ext cx="5489889" cy="1815882"/>
+          </a:xfrm>
+          <a:prstGeom prst="rect">
+            <a:avLst/>
+          </a:prstGeom>
+          <a:solidFill>
+            <a:schemeClr val="bg1">
+              <a:lumMod val="95000"/>
+            </a:schemeClr>
+          </a:solidFill>
+        </p:spPr>
+        <p:txBody>
+          <a:bodyPr wrap="square" rtlCol="0">
+            <a:spAutoFit/>
+          </a:bodyPr>
+          <a:lstStyle/>
+          <a:p>
+            <a:r>
+              <a:rPr lang="en-US" sz="1600" dirty="0" err="1">
+                <a:latin typeface="Courier New" panose="02070309020205020404" pitchFamily="49" charset="0"/>
+                <a:cs typeface="Courier New" panose="02070309020205020404" pitchFamily="49" charset="0"/>
+              </a:rPr>
+              <a:t>plotly</a:t>
+            </a:r>
+            <a:r>
+              <a:rPr lang="en-US" sz="1600" dirty="0">
+                <a:latin typeface="Courier New" panose="02070309020205020404" pitchFamily="49" charset="0"/>
+                <a:cs typeface="Courier New" panose="02070309020205020404" pitchFamily="49" charset="0"/>
+              </a:rPr>
+              <a:t>::</a:t>
+            </a:r>
+            <a:r>
+              <a:rPr lang="en-US" sz="1600" dirty="0" err="1">
+                <a:latin typeface="Courier New" panose="02070309020205020404" pitchFamily="49" charset="0"/>
+                <a:cs typeface="Courier New" panose="02070309020205020404" pitchFamily="49" charset="0"/>
+              </a:rPr>
+              <a:t>renderPlotly</a:t>
+            </a:r>
+            <a:r>
+              <a:rPr lang="en-US" sz="1600" b="1" dirty="0">
+                <a:solidFill>
+                  <a:srgbClr val="0070C0"/>
+                </a:solidFill>
+                <a:latin typeface="Courier New" panose="02070309020205020404" pitchFamily="49" charset="0"/>
+                <a:cs typeface="Courier New" panose="02070309020205020404" pitchFamily="49" charset="0"/>
+              </a:rPr>
+              <a:t>(</a:t>
+            </a:r>
+            <a:r>
+              <a:rPr lang="en-US" sz="1600" b="1" dirty="0">
+                <a:latin typeface="Courier New" panose="02070309020205020404" pitchFamily="49" charset="0"/>
+                <a:cs typeface="Courier New" panose="02070309020205020404" pitchFamily="49" charset="0"/>
+              </a:rPr>
+              <a:t> </a:t>
+            </a:r>
+            <a:r>
+              <a:rPr lang="en-US" sz="1600" dirty="0">
+                <a:solidFill>
+                  <a:schemeClr val="tx1">
+                    <a:lumMod val="50000"/>
+                    <a:lumOff val="50000"/>
+                  </a:schemeClr>
+                </a:solidFill>
+                <a:latin typeface="Courier New" panose="02070309020205020404" pitchFamily="49" charset="0"/>
+                <a:cs typeface="Courier New" panose="02070309020205020404" pitchFamily="49" charset="0"/>
+              </a:rPr>
+              <a:t># no {}</a:t>
+            </a:r>
+            <a:endParaRPr lang="en-US" sz="1600" dirty="0">
+              <a:latin typeface="Courier New" panose="02070309020205020404" pitchFamily="49" charset="0"/>
+              <a:cs typeface="Courier New" panose="02070309020205020404" pitchFamily="49" charset="0"/>
             </a:endParaRPr>
           </a:p>
           <a:p>
-            <a:endParaRPr lang="en-US" dirty="0">
-              <a:latin typeface="+mj-lt"/>
-            </a:endParaRPr>
+            <a:r>
+              <a:rPr lang="en-US" sz="1600" dirty="0">
+                <a:latin typeface="Courier New" panose="02070309020205020404" pitchFamily="49" charset="0"/>
+                <a:cs typeface="Courier New" panose="02070309020205020404" pitchFamily="49" charset="0"/>
+              </a:rPr>
+              <a:t>  </a:t>
+            </a:r>
+            <a:r>
+              <a:rPr lang="en-US" sz="1600" dirty="0" err="1">
+                <a:latin typeface="Courier New" panose="02070309020205020404" pitchFamily="49" charset="0"/>
+                <a:cs typeface="Courier New" panose="02070309020205020404" pitchFamily="49" charset="0"/>
+              </a:rPr>
+              <a:t>plotly</a:t>
+            </a:r>
+            <a:r>
+              <a:rPr lang="en-US" sz="1600" dirty="0">
+                <a:latin typeface="Courier New" panose="02070309020205020404" pitchFamily="49" charset="0"/>
+                <a:cs typeface="Courier New" panose="02070309020205020404" pitchFamily="49" charset="0"/>
+              </a:rPr>
+              <a:t>::</a:t>
+            </a:r>
+            <a:r>
+              <a:rPr lang="en-US" sz="1600" dirty="0" err="1">
+                <a:latin typeface="Courier New" panose="02070309020205020404" pitchFamily="49" charset="0"/>
+                <a:cs typeface="Courier New" panose="02070309020205020404" pitchFamily="49" charset="0"/>
+              </a:rPr>
+              <a:t>ggplotly</a:t>
+            </a:r>
+            <a:r>
+              <a:rPr lang="en-US" sz="1600" dirty="0">
+                <a:latin typeface="Courier New" panose="02070309020205020404" pitchFamily="49" charset="0"/>
+                <a:cs typeface="Courier New" panose="02070309020205020404" pitchFamily="49" charset="0"/>
+              </a:rPr>
+              <a:t>(</a:t>
+            </a:r>
+          </a:p>
+          <a:p>
+            <a:r>
+              <a:rPr lang="en-US" sz="1600" dirty="0">
+                <a:latin typeface="Courier New" panose="02070309020205020404" pitchFamily="49" charset="0"/>
+                <a:cs typeface="Courier New" panose="02070309020205020404" pitchFamily="49" charset="0"/>
+              </a:rPr>
+              <a:t>    </a:t>
+            </a:r>
+            <a:r>
+              <a:rPr lang="en-US" sz="1600" dirty="0" err="1">
+                <a:latin typeface="Courier New" panose="02070309020205020404" pitchFamily="49" charset="0"/>
+                <a:cs typeface="Courier New" panose="02070309020205020404" pitchFamily="49" charset="0"/>
+              </a:rPr>
+              <a:t>filtered_data</a:t>
+            </a:r>
+            <a:r>
+              <a:rPr lang="en-US" sz="1600" dirty="0">
+                <a:latin typeface="Courier New" panose="02070309020205020404" pitchFamily="49" charset="0"/>
+                <a:cs typeface="Courier New" panose="02070309020205020404" pitchFamily="49" charset="0"/>
+              </a:rPr>
+              <a:t>() %&gt;%</a:t>
+            </a:r>
+          </a:p>
+          <a:p>
+            <a:r>
+              <a:rPr lang="en-US" sz="1600" dirty="0">
+                <a:latin typeface="Courier New" panose="02070309020205020404" pitchFamily="49" charset="0"/>
+                <a:cs typeface="Courier New" panose="02070309020205020404" pitchFamily="49" charset="0"/>
+              </a:rPr>
+              <a:t>    </a:t>
+            </a:r>
+            <a:r>
+              <a:rPr lang="en-US" sz="1600" dirty="0" err="1">
+                <a:latin typeface="Courier New" panose="02070309020205020404" pitchFamily="49" charset="0"/>
+                <a:cs typeface="Courier New" panose="02070309020205020404" pitchFamily="49" charset="0"/>
+              </a:rPr>
+              <a:t>ggplot</a:t>
+            </a:r>
+            <a:r>
+              <a:rPr lang="en-US" sz="1600" dirty="0">
+                <a:latin typeface="Courier New" panose="02070309020205020404" pitchFamily="49" charset="0"/>
+                <a:cs typeface="Courier New" panose="02070309020205020404" pitchFamily="49" charset="0"/>
+              </a:rPr>
+              <a:t>(</a:t>
+            </a:r>
+            <a:r>
+              <a:rPr lang="en-US" sz="1600" dirty="0" err="1">
+                <a:latin typeface="Courier New" panose="02070309020205020404" pitchFamily="49" charset="0"/>
+                <a:cs typeface="Courier New" panose="02070309020205020404" pitchFamily="49" charset="0"/>
+              </a:rPr>
+              <a:t>aes</a:t>
+            </a:r>
+            <a:r>
+              <a:rPr lang="en-US" sz="1600" dirty="0">
+                <a:latin typeface="Courier New" panose="02070309020205020404" pitchFamily="49" charset="0"/>
+                <a:cs typeface="Courier New" panose="02070309020205020404" pitchFamily="49" charset="0"/>
+              </a:rPr>
+              <a:t>(y = breed, fill = type)) +</a:t>
+            </a:r>
+          </a:p>
+          <a:p>
+            <a:r>
+              <a:rPr lang="en-US" sz="1600" dirty="0">
+                <a:latin typeface="Courier New" panose="02070309020205020404" pitchFamily="49" charset="0"/>
+                <a:cs typeface="Courier New" panose="02070309020205020404" pitchFamily="49" charset="0"/>
+              </a:rPr>
+              <a:t>    </a:t>
+            </a:r>
+            <a:r>
+              <a:rPr lang="en-US" sz="1600" dirty="0" err="1">
+                <a:latin typeface="Courier New" panose="02070309020205020404" pitchFamily="49" charset="0"/>
+                <a:cs typeface="Courier New" panose="02070309020205020404" pitchFamily="49" charset="0"/>
+              </a:rPr>
+              <a:t>geom_bar</a:t>
+            </a:r>
+            <a:r>
+              <a:rPr lang="en-US" sz="1600" dirty="0">
+                <a:latin typeface="Courier New" panose="02070309020205020404" pitchFamily="49" charset="0"/>
+                <a:cs typeface="Courier New" panose="02070309020205020404" pitchFamily="49" charset="0"/>
+              </a:rPr>
+              <a:t>()</a:t>
+            </a:r>
+          </a:p>
+          <a:p>
+            <a:r>
+              <a:rPr lang="en-US" sz="1600" dirty="0">
+                <a:latin typeface="Courier New" panose="02070309020205020404" pitchFamily="49" charset="0"/>
+                <a:cs typeface="Courier New" panose="02070309020205020404" pitchFamily="49" charset="0"/>
+              </a:rPr>
+              <a:t>  )</a:t>
+            </a:r>
+          </a:p>
+          <a:p>
+            <a:r>
+              <a:rPr lang="en-US" sz="1600" b="1" dirty="0">
+                <a:solidFill>
+                  <a:srgbClr val="0070C0"/>
+                </a:solidFill>
+                <a:latin typeface="Courier New" panose="02070309020205020404" pitchFamily="49" charset="0"/>
+                <a:cs typeface="Courier New" panose="02070309020205020404" pitchFamily="49" charset="0"/>
+              </a:rPr>
+              <a:t>)</a:t>
+            </a:r>
           </a:p>
         </p:txBody>
       </p:sp>
     </p:spTree>
     <p:extLst>
       <p:ext uri="{BB962C8B-B14F-4D97-AF65-F5344CB8AC3E}">
-        <p14:creationId xmlns:p14="http://schemas.microsoft.com/office/powerpoint/2010/main" val="736209646"/>
+        <p14:creationId xmlns:p14="http://schemas.microsoft.com/office/powerpoint/2010/main" val="3097351964"/>
       </p:ext>
     </p:extLst>
   </p:cSld>
   <p:clrMapOvr>
     <a:masterClrMapping/>
   </p:clrMapOvr>
+  <p:timing>
+    <p:tnLst>
+      <p:par>
+        <p:cTn id="1" dur="indefinite" restart="never" nodeType="tmRoot">
+          <p:childTnLst>
+            <p:seq concurrent="1" nextAc="seek">
+              <p:cTn id="2" dur="indefinite" nodeType="mainSeq">
+                <p:childTnLst>
+                  <p:par>
+                    <p:cTn id="3" fill="hold">
+                      <p:stCondLst>
+                        <p:cond delay="indefinite"/>
+                      </p:stCondLst>
+                      <p:childTnLst>
+                        <p:par>
+                          <p:cTn id="4" fill="hold">
+                            <p:stCondLst>
+                              <p:cond delay="0"/>
+                            </p:stCondLst>
+                            <p:childTnLst>
+                              <p:par>
+                                <p:cTn id="5" presetID="1" presetClass="entr" presetSubtype="0" fill="hold" nodeType="clickEffect">
+                                  <p:stCondLst>
+                                    <p:cond delay="0"/>
+                                  </p:stCondLst>
+                                  <p:childTnLst>
+                                    <p:set>
+                                      <p:cBhvr>
+                                        <p:cTn id="6" dur="1" fill="hold">
+                                          <p:stCondLst>
+                                            <p:cond delay="0"/>
+                                          </p:stCondLst>
+                                        </p:cTn>
+                                        <p:tgtEl>
+                                          <p:spTgt spid="3">
+                                            <p:txEl>
+                                              <p:pRg st="0" end="0"/>
+                                            </p:txEl>
+                                          </p:spTgt>
+                                        </p:tgtEl>
+                                        <p:attrNameLst>
+                                          <p:attrName>style.visibility</p:attrName>
+                                        </p:attrNameLst>
+                                      </p:cBhvr>
+                                      <p:to>
+                                        <p:strVal val="visible"/>
+                                      </p:to>
+                                    </p:set>
+                                  </p:childTnLst>
+                                </p:cTn>
+                              </p:par>
+                              <p:par>
+                                <p:cTn id="7" presetID="1" presetClass="entr" presetSubtype="0" fill="hold" grpId="0" nodeType="withEffect">
+                                  <p:stCondLst>
+                                    <p:cond delay="0"/>
+                                  </p:stCondLst>
+                                  <p:childTnLst>
+                                    <p:set>
+                                      <p:cBhvr>
+                                        <p:cTn id="8" dur="1" fill="hold">
+                                          <p:stCondLst>
+                                            <p:cond delay="0"/>
+                                          </p:stCondLst>
+                                        </p:cTn>
+                                        <p:tgtEl>
+                                          <p:spTgt spid="4"/>
+                                        </p:tgtEl>
+                                        <p:attrNameLst>
+                                          <p:attrName>style.visibility</p:attrName>
+                                        </p:attrNameLst>
+                                      </p:cBhvr>
+                                      <p:to>
+                                        <p:strVal val="visible"/>
+                                      </p:to>
+                                    </p:set>
+                                  </p:childTnLst>
+                                </p:cTn>
+                              </p:par>
+                              <p:par>
+                                <p:cTn id="9" presetID="1" presetClass="entr" presetSubtype="0" fill="hold" grpId="0" nodeType="withEffect">
+                                  <p:stCondLst>
+                                    <p:cond delay="0"/>
+                                  </p:stCondLst>
+                                  <p:childTnLst>
+                                    <p:set>
+                                      <p:cBhvr>
+                                        <p:cTn id="10" dur="1" fill="hold">
+                                          <p:stCondLst>
+                                            <p:cond delay="0"/>
+                                          </p:stCondLst>
+                                        </p:cTn>
+                                        <p:tgtEl>
+                                          <p:spTgt spid="5"/>
+                                        </p:tgtEl>
+                                        <p:attrNameLst>
+                                          <p:attrName>style.visibility</p:attrName>
+                                        </p:attrNameLst>
+                                      </p:cBhvr>
+                                      <p:to>
+                                        <p:strVal val="visible"/>
+                                      </p:to>
+                                    </p:set>
+                                  </p:childTnLst>
+                                </p:cTn>
+                              </p:par>
+                            </p:childTnLst>
+                          </p:cTn>
+                        </p:par>
+                      </p:childTnLst>
+                    </p:cTn>
+                  </p:par>
+                  <p:par>
+                    <p:cTn id="11" fill="hold">
+                      <p:stCondLst>
+                        <p:cond delay="indefinite"/>
+                      </p:stCondLst>
+                      <p:childTnLst>
+                        <p:par>
+                          <p:cTn id="12" fill="hold">
+                            <p:stCondLst>
+                              <p:cond delay="0"/>
+                            </p:stCondLst>
+                            <p:childTnLst>
+                              <p:par>
+                                <p:cTn id="13" presetID="1" presetClass="entr" presetSubtype="0" fill="hold" nodeType="clickEffect">
+                                  <p:stCondLst>
+                                    <p:cond delay="0"/>
+                                  </p:stCondLst>
+                                  <p:childTnLst>
+                                    <p:set>
+                                      <p:cBhvr>
+                                        <p:cTn id="14" dur="1" fill="hold">
+                                          <p:stCondLst>
+                                            <p:cond delay="0"/>
+                                          </p:stCondLst>
+                                        </p:cTn>
+                                        <p:tgtEl>
+                                          <p:spTgt spid="3">
+                                            <p:txEl>
+                                              <p:pRg st="2" end="2"/>
+                                            </p:txEl>
+                                          </p:spTgt>
+                                        </p:tgtEl>
+                                        <p:attrNameLst>
+                                          <p:attrName>style.visibility</p:attrName>
+                                        </p:attrNameLst>
+                                      </p:cBhvr>
+                                      <p:to>
+                                        <p:strVal val="visible"/>
+                                      </p:to>
+                                    </p:set>
+                                  </p:childTnLst>
+                                </p:cTn>
+                              </p:par>
+                            </p:childTnLst>
+                          </p:cTn>
+                        </p:par>
+                      </p:childTnLst>
+                    </p:cTn>
+                  </p:par>
+                  <p:par>
+                    <p:cTn id="15" fill="hold">
+                      <p:stCondLst>
+                        <p:cond delay="indefinite"/>
+                      </p:stCondLst>
+                      <p:childTnLst>
+                        <p:par>
+                          <p:cTn id="16" fill="hold">
+                            <p:stCondLst>
+                              <p:cond delay="0"/>
+                            </p:stCondLst>
+                            <p:childTnLst>
+                              <p:par>
+                                <p:cTn id="17" presetID="1" presetClass="entr" presetSubtype="0" fill="hold" nodeType="clickEffect">
+                                  <p:stCondLst>
+                                    <p:cond delay="0"/>
+                                  </p:stCondLst>
+                                  <p:childTnLst>
+                                    <p:set>
+                                      <p:cBhvr>
+                                        <p:cTn id="18" dur="1" fill="hold">
+                                          <p:stCondLst>
+                                            <p:cond delay="0"/>
+                                          </p:stCondLst>
+                                        </p:cTn>
+                                        <p:tgtEl>
+                                          <p:spTgt spid="3">
+                                            <p:txEl>
+                                              <p:pRg st="4" end="4"/>
+                                            </p:txEl>
+                                          </p:spTgt>
+                                        </p:tgtEl>
+                                        <p:attrNameLst>
+                                          <p:attrName>style.visibility</p:attrName>
+                                        </p:attrNameLst>
+                                      </p:cBhvr>
+                                      <p:to>
+                                        <p:strVal val="visible"/>
+                                      </p:to>
+                                    </p:set>
+                                  </p:childTnLst>
+                                </p:cTn>
+                              </p:par>
+                            </p:childTnLst>
+                          </p:cTn>
+                        </p:par>
+                      </p:childTnLst>
+                    </p:cTn>
+                  </p:par>
+                  <p:par>
+                    <p:cTn id="19" fill="hold">
+                      <p:stCondLst>
+                        <p:cond delay="indefinite"/>
+                      </p:stCondLst>
+                      <p:childTnLst>
+                        <p:par>
+                          <p:cTn id="20" fill="hold">
+                            <p:stCondLst>
+                              <p:cond delay="0"/>
+                            </p:stCondLst>
+                            <p:childTnLst>
+                              <p:par>
+                                <p:cTn id="21" presetID="1" presetClass="entr" presetSubtype="0" fill="hold" nodeType="clickEffect">
+                                  <p:stCondLst>
+                                    <p:cond delay="0"/>
+                                  </p:stCondLst>
+                                  <p:childTnLst>
+                                    <p:set>
+                                      <p:cBhvr>
+                                        <p:cTn id="22" dur="1" fill="hold">
+                                          <p:stCondLst>
+                                            <p:cond delay="0"/>
+                                          </p:stCondLst>
+                                        </p:cTn>
+                                        <p:tgtEl>
+                                          <p:spTgt spid="3">
+                                            <p:txEl>
+                                              <p:pRg st="6" end="6"/>
+                                            </p:txEl>
+                                          </p:spTgt>
+                                        </p:tgtEl>
+                                        <p:attrNameLst>
+                                          <p:attrName>style.visibility</p:attrName>
+                                        </p:attrNameLst>
+                                      </p:cBhvr>
+                                      <p:to>
+                                        <p:strVal val="visible"/>
+                                      </p:to>
+                                    </p:set>
+                                  </p:childTnLst>
+                                </p:cTn>
+                              </p:par>
+                            </p:childTnLst>
+                          </p:cTn>
+                        </p:par>
+                      </p:childTnLst>
+                    </p:cTn>
+                  </p:par>
+                </p:childTnLst>
+              </p:cTn>
+              <p:prevCondLst>
+                <p:cond evt="onPrev" delay="0">
+                  <p:tgtEl>
+                    <p:sldTgt/>
+                  </p:tgtEl>
+                </p:cond>
+              </p:prevCondLst>
+              <p:nextCondLst>
+                <p:cond evt="onNext" delay="0">
+                  <p:tgtEl>
+                    <p:sldTgt/>
+                  </p:tgtEl>
+                </p:cond>
+              </p:nextCondLst>
+            </p:seq>
+          </p:childTnLst>
+        </p:cTn>
+      </p:par>
+    </p:tnLst>
+    <p:bldLst>
+      <p:bldP spid="4" grpId="0" animBg="1"/>
+      <p:bldP spid="5" grpId="0" animBg="1"/>
+    </p:bldLst>
+  </p:timing>
 </p:sld>
 </file>
 

</xml_diff>